<commit_message>
bergupdate: changed a few things in CGHcall.R: it now uses X and Y chromosomes data, and handling plots is a bit easier now.
</commit_message>
<xml_diff>
--- a/docs/docs_I_made/slides/ASCAT.pptx
+++ b/docs/docs_I_made/slides/ASCAT.pptx
@@ -902,7 +902,7 @@
             <a:fld id="{B61BEF0D-F0BB-DE4B-95CE-6DB70DBA9567}" type="datetimeFigureOut">
               <a:rPr lang="en-US" smtClean="0"/>
               <a:pPr/>
-              <a:t>4/25/2022</a:t>
+              <a:t>4/26/2022</a:t>
             </a:fld>
             <a:endParaRPr lang="en-US" dirty="0"/>
           </a:p>
@@ -1155,7 +1155,7 @@
             <a:fld id="{B61BEF0D-F0BB-DE4B-95CE-6DB70DBA9567}" type="datetimeFigureOut">
               <a:rPr lang="en-US" smtClean="0"/>
               <a:pPr/>
-              <a:t>4/25/2022</a:t>
+              <a:t>4/26/2022</a:t>
             </a:fld>
             <a:endParaRPr lang="en-US" dirty="0"/>
           </a:p>
@@ -1471,7 +1471,7 @@
             <a:fld id="{B61BEF0D-F0BB-DE4B-95CE-6DB70DBA9567}" type="datetimeFigureOut">
               <a:rPr lang="en-US" smtClean="0"/>
               <a:pPr/>
-              <a:t>4/25/2022</a:t>
+              <a:t>4/26/2022</a:t>
             </a:fld>
             <a:endParaRPr lang="en-US" dirty="0"/>
           </a:p>
@@ -1806,7 +1806,7 @@
             <a:fld id="{B61BEF0D-F0BB-DE4B-95CE-6DB70DBA9567}" type="datetimeFigureOut">
               <a:rPr lang="en-US" smtClean="0"/>
               <a:pPr/>
-              <a:t>4/25/2022</a:t>
+              <a:t>4/26/2022</a:t>
             </a:fld>
             <a:endParaRPr lang="en-US" dirty="0"/>
           </a:p>
@@ -2122,7 +2122,7 @@
             <a:fld id="{B61BEF0D-F0BB-DE4B-95CE-6DB70DBA9567}" type="datetimeFigureOut">
               <a:rPr lang="en-US" smtClean="0"/>
               <a:pPr/>
-              <a:t>4/25/2022</a:t>
+              <a:t>4/26/2022</a:t>
             </a:fld>
             <a:endParaRPr lang="en-US" dirty="0"/>
           </a:p>
@@ -2517,7 +2517,7 @@
             <a:fld id="{B61BEF0D-F0BB-DE4B-95CE-6DB70DBA9567}" type="datetimeFigureOut">
               <a:rPr lang="en-US" smtClean="0"/>
               <a:pPr/>
-              <a:t>4/25/2022</a:t>
+              <a:t>4/26/2022</a:t>
             </a:fld>
             <a:endParaRPr lang="en-US" dirty="0"/>
           </a:p>
@@ -2688,7 +2688,7 @@
           <a:p>
             <a:fld id="{55C6B4A9-1611-4792-9094-5F34BCA07E0B}" type="datetimeFigureOut">
               <a:rPr lang="en-US" smtClean="0"/>
-              <a:t>4/25/2022</a:t>
+              <a:t>4/26/2022</a:t>
             </a:fld>
             <a:endParaRPr lang="en-US" dirty="0"/>
           </a:p>
@@ -2869,7 +2869,7 @@
             <a:fld id="{B61BEF0D-F0BB-DE4B-95CE-6DB70DBA9567}" type="datetimeFigureOut">
               <a:rPr lang="en-US" smtClean="0"/>
               <a:pPr/>
-              <a:t>4/25/2022</a:t>
+              <a:t>4/26/2022</a:t>
             </a:fld>
             <a:endParaRPr lang="en-US" dirty="0"/>
           </a:p>
@@ -3041,7 +3041,7 @@
             <a:fld id="{B61BEF0D-F0BB-DE4B-95CE-6DB70DBA9567}" type="datetimeFigureOut">
               <a:rPr lang="en-US" smtClean="0"/>
               <a:pPr/>
-              <a:t>4/25/2022</a:t>
+              <a:t>4/26/2022</a:t>
             </a:fld>
             <a:endParaRPr lang="en-US" dirty="0"/>
           </a:p>
@@ -3290,7 +3290,7 @@
             <a:fld id="{B61BEF0D-F0BB-DE4B-95CE-6DB70DBA9567}" type="datetimeFigureOut">
               <a:rPr lang="en-US" smtClean="0"/>
               <a:pPr/>
-              <a:t>4/25/2022</a:t>
+              <a:t>4/26/2022</a:t>
             </a:fld>
             <a:endParaRPr lang="en-US" dirty="0"/>
           </a:p>
@@ -3523,7 +3523,7 @@
           <a:p>
             <a:fld id="{EB712588-04B1-427B-82EE-E8DB90309F08}" type="datetimeFigureOut">
               <a:rPr lang="en-US" smtClean="0"/>
-              <a:t>4/25/2022</a:t>
+              <a:t>4/26/2022</a:t>
             </a:fld>
             <a:endParaRPr lang="en-US" dirty="0"/>
           </a:p>
@@ -3898,7 +3898,7 @@
             <a:fld id="{B61BEF0D-F0BB-DE4B-95CE-6DB70DBA9567}" type="datetimeFigureOut">
               <a:rPr lang="en-US" smtClean="0"/>
               <a:pPr/>
-              <a:t>4/25/2022</a:t>
+              <a:t>4/26/2022</a:t>
             </a:fld>
             <a:endParaRPr lang="en-US" dirty="0"/>
           </a:p>
@@ -4023,7 +4023,7 @@
             <a:fld id="{B61BEF0D-F0BB-DE4B-95CE-6DB70DBA9567}" type="datetimeFigureOut">
               <a:rPr lang="en-US" smtClean="0"/>
               <a:pPr/>
-              <a:t>4/25/2022</a:t>
+              <a:t>4/26/2022</a:t>
             </a:fld>
             <a:endParaRPr lang="en-US" dirty="0"/>
           </a:p>
@@ -4120,7 +4120,7 @@
             <a:fld id="{B61BEF0D-F0BB-DE4B-95CE-6DB70DBA9567}" type="datetimeFigureOut">
               <a:rPr lang="en-US" smtClean="0"/>
               <a:pPr/>
-              <a:t>4/25/2022</a:t>
+              <a:t>4/26/2022</a:t>
             </a:fld>
             <a:endParaRPr lang="en-US" dirty="0"/>
           </a:p>
@@ -4376,7 +4376,7 @@
           <a:p>
             <a:fld id="{42A54C80-263E-416B-A8E0-580EDEADCBDC}" type="datetimeFigureOut">
               <a:rPr lang="en-US" smtClean="0"/>
-              <a:t>4/25/2022</a:t>
+              <a:t>4/26/2022</a:t>
             </a:fld>
             <a:endParaRPr lang="en-US" dirty="0"/>
           </a:p>
@@ -4683,7 +4683,7 @@
             <a:fld id="{B61BEF0D-F0BB-DE4B-95CE-6DB70DBA9567}" type="datetimeFigureOut">
               <a:rPr lang="en-US" smtClean="0"/>
               <a:pPr/>
-              <a:t>4/25/2022</a:t>
+              <a:t>4/26/2022</a:t>
             </a:fld>
             <a:endParaRPr lang="en-US" dirty="0"/>
           </a:p>
@@ -5386,7 +5386,7 @@
             <a:fld id="{B61BEF0D-F0BB-DE4B-95CE-6DB70DBA9567}" type="datetimeFigureOut">
               <a:rPr lang="en-US" smtClean="0"/>
               <a:pPr/>
-              <a:t>4/25/2022</a:t>
+              <a:t>4/26/2022</a:t>
             </a:fld>
             <a:endParaRPr lang="en-US" dirty="0"/>
           </a:p>
@@ -33510,7 +33510,7 @@
         </p:spPr>
         <p:txBody>
           <a:bodyPr vert="horz" lIns="91440" tIns="45720" rIns="91440" bIns="45720" rtlCol="0">
-            <a:normAutofit/>
+            <a:normAutofit fontScale="92500" lnSpcReduction="10000"/>
           </a:bodyPr>
           <a:lstStyle>
             <a:lvl1pPr marL="342900" indent="-342900" algn="l" defTabSz="457200" rtl="0" eaLnBrk="1" latinLnBrk="0" hangingPunct="1">
@@ -33751,7 +33751,7 @@
                   </a:schemeClr>
                 </a:solidFill>
               </a:rPr>
-              <a:t>Estimer le nombre de copies en tenant compte de la cellularité et de la ploïdie</a:t>
+              <a:t>Comment ASCAT estime le nombre de copies en tenant compte de la cellularité et de la ploïdie?</a:t>
             </a:r>
             <a:endParaRPr lang="fr-FR" sz="2200" dirty="0">
               <a:solidFill>
@@ -36957,7 +36957,7 @@
         </p:blipFill>
         <p:spPr>
           <a:xfrm>
-            <a:off x="1021416" y="1848269"/>
+            <a:off x="1021416" y="1834358"/>
             <a:ext cx="9144018" cy="2286005"/>
           </a:xfrm>
           <a:prstGeom prst="rect">

</xml_diff>

<commit_message>
bergupdate: Made oncoscanR slides, gotta finish them.
</commit_message>
<xml_diff>
--- a/docs/docs_I_made/slides/ASCAT.pptx
+++ b/docs/docs_I_made/slides/ASCAT.pptx
@@ -902,7 +902,7 @@
             <a:fld id="{B61BEF0D-F0BB-DE4B-95CE-6DB70DBA9567}" type="datetimeFigureOut">
               <a:rPr lang="en-US" smtClean="0"/>
               <a:pPr/>
-              <a:t>4/26/2022</a:t>
+              <a:t>4/27/2022</a:t>
             </a:fld>
             <a:endParaRPr lang="en-US" dirty="0"/>
           </a:p>
@@ -1155,7 +1155,7 @@
             <a:fld id="{B61BEF0D-F0BB-DE4B-95CE-6DB70DBA9567}" type="datetimeFigureOut">
               <a:rPr lang="en-US" smtClean="0"/>
               <a:pPr/>
-              <a:t>4/26/2022</a:t>
+              <a:t>4/27/2022</a:t>
             </a:fld>
             <a:endParaRPr lang="en-US" dirty="0"/>
           </a:p>
@@ -1471,7 +1471,7 @@
             <a:fld id="{B61BEF0D-F0BB-DE4B-95CE-6DB70DBA9567}" type="datetimeFigureOut">
               <a:rPr lang="en-US" smtClean="0"/>
               <a:pPr/>
-              <a:t>4/26/2022</a:t>
+              <a:t>4/27/2022</a:t>
             </a:fld>
             <a:endParaRPr lang="en-US" dirty="0"/>
           </a:p>
@@ -1806,7 +1806,7 @@
             <a:fld id="{B61BEF0D-F0BB-DE4B-95CE-6DB70DBA9567}" type="datetimeFigureOut">
               <a:rPr lang="en-US" smtClean="0"/>
               <a:pPr/>
-              <a:t>4/26/2022</a:t>
+              <a:t>4/27/2022</a:t>
             </a:fld>
             <a:endParaRPr lang="en-US" dirty="0"/>
           </a:p>
@@ -2122,7 +2122,7 @@
             <a:fld id="{B61BEF0D-F0BB-DE4B-95CE-6DB70DBA9567}" type="datetimeFigureOut">
               <a:rPr lang="en-US" smtClean="0"/>
               <a:pPr/>
-              <a:t>4/26/2022</a:t>
+              <a:t>4/27/2022</a:t>
             </a:fld>
             <a:endParaRPr lang="en-US" dirty="0"/>
           </a:p>
@@ -2517,7 +2517,7 @@
             <a:fld id="{B61BEF0D-F0BB-DE4B-95CE-6DB70DBA9567}" type="datetimeFigureOut">
               <a:rPr lang="en-US" smtClean="0"/>
               <a:pPr/>
-              <a:t>4/26/2022</a:t>
+              <a:t>4/27/2022</a:t>
             </a:fld>
             <a:endParaRPr lang="en-US" dirty="0"/>
           </a:p>
@@ -2688,7 +2688,7 @@
           <a:p>
             <a:fld id="{55C6B4A9-1611-4792-9094-5F34BCA07E0B}" type="datetimeFigureOut">
               <a:rPr lang="en-US" smtClean="0"/>
-              <a:t>4/26/2022</a:t>
+              <a:t>4/27/2022</a:t>
             </a:fld>
             <a:endParaRPr lang="en-US" dirty="0"/>
           </a:p>
@@ -2869,7 +2869,7 @@
             <a:fld id="{B61BEF0D-F0BB-DE4B-95CE-6DB70DBA9567}" type="datetimeFigureOut">
               <a:rPr lang="en-US" smtClean="0"/>
               <a:pPr/>
-              <a:t>4/26/2022</a:t>
+              <a:t>4/27/2022</a:t>
             </a:fld>
             <a:endParaRPr lang="en-US" dirty="0"/>
           </a:p>
@@ -3041,7 +3041,7 @@
             <a:fld id="{B61BEF0D-F0BB-DE4B-95CE-6DB70DBA9567}" type="datetimeFigureOut">
               <a:rPr lang="en-US" smtClean="0"/>
               <a:pPr/>
-              <a:t>4/26/2022</a:t>
+              <a:t>4/27/2022</a:t>
             </a:fld>
             <a:endParaRPr lang="en-US" dirty="0"/>
           </a:p>
@@ -3290,7 +3290,7 @@
             <a:fld id="{B61BEF0D-F0BB-DE4B-95CE-6DB70DBA9567}" type="datetimeFigureOut">
               <a:rPr lang="en-US" smtClean="0"/>
               <a:pPr/>
-              <a:t>4/26/2022</a:t>
+              <a:t>4/27/2022</a:t>
             </a:fld>
             <a:endParaRPr lang="en-US" dirty="0"/>
           </a:p>
@@ -3523,7 +3523,7 @@
           <a:p>
             <a:fld id="{EB712588-04B1-427B-82EE-E8DB90309F08}" type="datetimeFigureOut">
               <a:rPr lang="en-US" smtClean="0"/>
-              <a:t>4/26/2022</a:t>
+              <a:t>4/27/2022</a:t>
             </a:fld>
             <a:endParaRPr lang="en-US" dirty="0"/>
           </a:p>
@@ -3898,7 +3898,7 @@
             <a:fld id="{B61BEF0D-F0BB-DE4B-95CE-6DB70DBA9567}" type="datetimeFigureOut">
               <a:rPr lang="en-US" smtClean="0"/>
               <a:pPr/>
-              <a:t>4/26/2022</a:t>
+              <a:t>4/27/2022</a:t>
             </a:fld>
             <a:endParaRPr lang="en-US" dirty="0"/>
           </a:p>
@@ -4023,7 +4023,7 @@
             <a:fld id="{B61BEF0D-F0BB-DE4B-95CE-6DB70DBA9567}" type="datetimeFigureOut">
               <a:rPr lang="en-US" smtClean="0"/>
               <a:pPr/>
-              <a:t>4/26/2022</a:t>
+              <a:t>4/27/2022</a:t>
             </a:fld>
             <a:endParaRPr lang="en-US" dirty="0"/>
           </a:p>
@@ -4120,7 +4120,7 @@
             <a:fld id="{B61BEF0D-F0BB-DE4B-95CE-6DB70DBA9567}" type="datetimeFigureOut">
               <a:rPr lang="en-US" smtClean="0"/>
               <a:pPr/>
-              <a:t>4/26/2022</a:t>
+              <a:t>4/27/2022</a:t>
             </a:fld>
             <a:endParaRPr lang="en-US" dirty="0"/>
           </a:p>
@@ -4376,7 +4376,7 @@
           <a:p>
             <a:fld id="{42A54C80-263E-416B-A8E0-580EDEADCBDC}" type="datetimeFigureOut">
               <a:rPr lang="en-US" smtClean="0"/>
-              <a:t>4/26/2022</a:t>
+              <a:t>4/27/2022</a:t>
             </a:fld>
             <a:endParaRPr lang="en-US" dirty="0"/>
           </a:p>
@@ -4683,7 +4683,7 @@
             <a:fld id="{B61BEF0D-F0BB-DE4B-95CE-6DB70DBA9567}" type="datetimeFigureOut">
               <a:rPr lang="en-US" smtClean="0"/>
               <a:pPr/>
-              <a:t>4/26/2022</a:t>
+              <a:t>4/27/2022</a:t>
             </a:fld>
             <a:endParaRPr lang="en-US" dirty="0"/>
           </a:p>
@@ -5386,7 +5386,7 @@
             <a:fld id="{B61BEF0D-F0BB-DE4B-95CE-6DB70DBA9567}" type="datetimeFigureOut">
               <a:rPr lang="en-US" smtClean="0"/>
               <a:pPr/>
-              <a:t>4/26/2022</a:t>
+              <a:t>4/27/2022</a:t>
             </a:fld>
             <a:endParaRPr lang="en-US" dirty="0"/>
           </a:p>
@@ -17162,7 +17162,7 @@
         </p:nvSpPr>
         <p:spPr>
           <a:xfrm>
-            <a:off x="4290029" y="4655834"/>
+            <a:off x="3953967" y="4671465"/>
             <a:ext cx="962526" cy="813496"/>
           </a:xfrm>
           <a:prstGeom prst="rect">
@@ -17220,7 +17220,7 @@
         </p:nvSpPr>
         <p:spPr>
           <a:xfrm>
-            <a:off x="7715018" y="1547034"/>
+            <a:off x="7378956" y="1562665"/>
             <a:ext cx="1801399" cy="1430433"/>
           </a:xfrm>
           <a:prstGeom prst="rect">
@@ -17349,7 +17349,7 @@
         </p:nvSpPr>
         <p:spPr>
           <a:xfrm>
-            <a:off x="6538539" y="4655831"/>
+            <a:off x="6202477" y="4671462"/>
             <a:ext cx="962526" cy="813496"/>
           </a:xfrm>
           <a:prstGeom prst="rect">
@@ -17407,7 +17407,7 @@
         </p:nvSpPr>
         <p:spPr>
           <a:xfrm>
-            <a:off x="2041519" y="4655831"/>
+            <a:off x="1705457" y="4671462"/>
             <a:ext cx="962526" cy="813496"/>
           </a:xfrm>
           <a:prstGeom prst="rect">
@@ -17460,7 +17460,7 @@
         </p:nvSpPr>
         <p:spPr>
           <a:xfrm>
-            <a:off x="5101938" y="1547034"/>
+            <a:off x="4765876" y="1562665"/>
             <a:ext cx="1682638" cy="1430433"/>
           </a:xfrm>
           <a:prstGeom prst="rect">
@@ -17537,7 +17537,7 @@
         </p:nvSpPr>
         <p:spPr>
           <a:xfrm>
-            <a:off x="9887432" y="3301421"/>
+            <a:off x="9551370" y="3317052"/>
             <a:ext cx="962526" cy="813496"/>
           </a:xfrm>
           <a:prstGeom prst="rect">
@@ -17609,7 +17609,7 @@
         </p:blipFill>
         <p:spPr>
           <a:xfrm>
-            <a:off x="2134547" y="3301421"/>
+            <a:off x="1798485" y="3317052"/>
             <a:ext cx="7486191" cy="1761158"/>
           </a:xfrm>
           <a:prstGeom prst="rect">

</xml_diff>

<commit_message>
bergupdate: changed comparative table, and things in scripts also.
</commit_message>
<xml_diff>
--- a/docs/docs_I_made/slides/ASCAT.pptx
+++ b/docs/docs_I_made/slides/ASCAT.pptx
@@ -46,12 +46,13 @@
     <p:sldId id="324" r:id="rId40"/>
     <p:sldId id="333" r:id="rId41"/>
     <p:sldId id="336" r:id="rId42"/>
-    <p:sldId id="337" r:id="rId43"/>
-    <p:sldId id="332" r:id="rId44"/>
-    <p:sldId id="298" r:id="rId45"/>
+    <p:sldId id="340" r:id="rId43"/>
+    <p:sldId id="337" r:id="rId44"/>
+    <p:sldId id="332" r:id="rId45"/>
     <p:sldId id="300" r:id="rId46"/>
     <p:sldId id="301" r:id="rId47"/>
     <p:sldId id="296" r:id="rId48"/>
+    <p:sldId id="298" r:id="rId49"/>
   </p:sldIdLst>
   <p:sldSz cx="12192000" cy="6858000"/>
   <p:notesSz cx="6858000" cy="9144000"/>
@@ -904,7 +905,7 @@
             <a:fld id="{B61BEF0D-F0BB-DE4B-95CE-6DB70DBA9567}" type="datetimeFigureOut">
               <a:rPr lang="en-US" smtClean="0"/>
               <a:pPr/>
-              <a:t>4/29/2022</a:t>
+              <a:t>5/2/2022</a:t>
             </a:fld>
             <a:endParaRPr lang="en-US" dirty="0"/>
           </a:p>
@@ -1157,7 +1158,7 @@
             <a:fld id="{B61BEF0D-F0BB-DE4B-95CE-6DB70DBA9567}" type="datetimeFigureOut">
               <a:rPr lang="en-US" smtClean="0"/>
               <a:pPr/>
-              <a:t>4/29/2022</a:t>
+              <a:t>5/2/2022</a:t>
             </a:fld>
             <a:endParaRPr lang="en-US" dirty="0"/>
           </a:p>
@@ -1473,7 +1474,7 @@
             <a:fld id="{B61BEF0D-F0BB-DE4B-95CE-6DB70DBA9567}" type="datetimeFigureOut">
               <a:rPr lang="en-US" smtClean="0"/>
               <a:pPr/>
-              <a:t>4/29/2022</a:t>
+              <a:t>5/2/2022</a:t>
             </a:fld>
             <a:endParaRPr lang="en-US" dirty="0"/>
           </a:p>
@@ -1808,7 +1809,7 @@
             <a:fld id="{B61BEF0D-F0BB-DE4B-95CE-6DB70DBA9567}" type="datetimeFigureOut">
               <a:rPr lang="en-US" smtClean="0"/>
               <a:pPr/>
-              <a:t>4/29/2022</a:t>
+              <a:t>5/2/2022</a:t>
             </a:fld>
             <a:endParaRPr lang="en-US" dirty="0"/>
           </a:p>
@@ -2124,7 +2125,7 @@
             <a:fld id="{B61BEF0D-F0BB-DE4B-95CE-6DB70DBA9567}" type="datetimeFigureOut">
               <a:rPr lang="en-US" smtClean="0"/>
               <a:pPr/>
-              <a:t>4/29/2022</a:t>
+              <a:t>5/2/2022</a:t>
             </a:fld>
             <a:endParaRPr lang="en-US" dirty="0"/>
           </a:p>
@@ -2519,7 +2520,7 @@
             <a:fld id="{B61BEF0D-F0BB-DE4B-95CE-6DB70DBA9567}" type="datetimeFigureOut">
               <a:rPr lang="en-US" smtClean="0"/>
               <a:pPr/>
-              <a:t>4/29/2022</a:t>
+              <a:t>5/2/2022</a:t>
             </a:fld>
             <a:endParaRPr lang="en-US" dirty="0"/>
           </a:p>
@@ -2690,7 +2691,7 @@
           <a:p>
             <a:fld id="{55C6B4A9-1611-4792-9094-5F34BCA07E0B}" type="datetimeFigureOut">
               <a:rPr lang="en-US" smtClean="0"/>
-              <a:t>4/29/2022</a:t>
+              <a:t>5/2/2022</a:t>
             </a:fld>
             <a:endParaRPr lang="en-US" dirty="0"/>
           </a:p>
@@ -2871,7 +2872,7 @@
             <a:fld id="{B61BEF0D-F0BB-DE4B-95CE-6DB70DBA9567}" type="datetimeFigureOut">
               <a:rPr lang="en-US" smtClean="0"/>
               <a:pPr/>
-              <a:t>4/29/2022</a:t>
+              <a:t>5/2/2022</a:t>
             </a:fld>
             <a:endParaRPr lang="en-US" dirty="0"/>
           </a:p>
@@ -3043,7 +3044,7 @@
             <a:fld id="{B61BEF0D-F0BB-DE4B-95CE-6DB70DBA9567}" type="datetimeFigureOut">
               <a:rPr lang="en-US" smtClean="0"/>
               <a:pPr/>
-              <a:t>4/29/2022</a:t>
+              <a:t>5/2/2022</a:t>
             </a:fld>
             <a:endParaRPr lang="en-US" dirty="0"/>
           </a:p>
@@ -3292,7 +3293,7 @@
             <a:fld id="{B61BEF0D-F0BB-DE4B-95CE-6DB70DBA9567}" type="datetimeFigureOut">
               <a:rPr lang="en-US" smtClean="0"/>
               <a:pPr/>
-              <a:t>4/29/2022</a:t>
+              <a:t>5/2/2022</a:t>
             </a:fld>
             <a:endParaRPr lang="en-US" dirty="0"/>
           </a:p>
@@ -3525,7 +3526,7 @@
           <a:p>
             <a:fld id="{EB712588-04B1-427B-82EE-E8DB90309F08}" type="datetimeFigureOut">
               <a:rPr lang="en-US" smtClean="0"/>
-              <a:t>4/29/2022</a:t>
+              <a:t>5/2/2022</a:t>
             </a:fld>
             <a:endParaRPr lang="en-US" dirty="0"/>
           </a:p>
@@ -3900,7 +3901,7 @@
             <a:fld id="{B61BEF0D-F0BB-DE4B-95CE-6DB70DBA9567}" type="datetimeFigureOut">
               <a:rPr lang="en-US" smtClean="0"/>
               <a:pPr/>
-              <a:t>4/29/2022</a:t>
+              <a:t>5/2/2022</a:t>
             </a:fld>
             <a:endParaRPr lang="en-US" dirty="0"/>
           </a:p>
@@ -4025,7 +4026,7 @@
             <a:fld id="{B61BEF0D-F0BB-DE4B-95CE-6DB70DBA9567}" type="datetimeFigureOut">
               <a:rPr lang="en-US" smtClean="0"/>
               <a:pPr/>
-              <a:t>4/29/2022</a:t>
+              <a:t>5/2/2022</a:t>
             </a:fld>
             <a:endParaRPr lang="en-US" dirty="0"/>
           </a:p>
@@ -4122,7 +4123,7 @@
             <a:fld id="{B61BEF0D-F0BB-DE4B-95CE-6DB70DBA9567}" type="datetimeFigureOut">
               <a:rPr lang="en-US" smtClean="0"/>
               <a:pPr/>
-              <a:t>4/29/2022</a:t>
+              <a:t>5/2/2022</a:t>
             </a:fld>
             <a:endParaRPr lang="en-US" dirty="0"/>
           </a:p>
@@ -4378,7 +4379,7 @@
           <a:p>
             <a:fld id="{42A54C80-263E-416B-A8E0-580EDEADCBDC}" type="datetimeFigureOut">
               <a:rPr lang="en-US" smtClean="0"/>
-              <a:t>4/29/2022</a:t>
+              <a:t>5/2/2022</a:t>
             </a:fld>
             <a:endParaRPr lang="en-US" dirty="0"/>
           </a:p>
@@ -4685,7 +4686,7 @@
             <a:fld id="{B61BEF0D-F0BB-DE4B-95CE-6DB70DBA9567}" type="datetimeFigureOut">
               <a:rPr lang="en-US" smtClean="0"/>
               <a:pPr/>
-              <a:t>4/29/2022</a:t>
+              <a:t>5/2/2022</a:t>
             </a:fld>
             <a:endParaRPr lang="en-US" dirty="0"/>
           </a:p>
@@ -5388,7 +5389,7 @@
             <a:fld id="{B61BEF0D-F0BB-DE4B-95CE-6DB70DBA9567}" type="datetimeFigureOut">
               <a:rPr lang="en-US" smtClean="0"/>
               <a:pPr/>
-              <a:t>4/29/2022</a:t>
+              <a:t>5/2/2022</a:t>
             </a:fld>
             <a:endParaRPr lang="en-US" dirty="0"/>
           </a:p>
@@ -16396,11 +16397,7 @@
             </a:pPr>
             <a:r>
               <a:rPr lang="fr-FR" dirty="0" smtClean="0"/>
-              <a:t>Estime le nombre de copies réel pour chaque </a:t>
-            </a:r>
-            <a:r>
-              <a:rPr lang="fr-FR" dirty="0" smtClean="0"/>
-              <a:t>allèle, donc des nombres entiers.</a:t>
+              <a:t>Estime le nombre de copies réel pour chaque allèle, donc des nombres entiers.</a:t>
             </a:r>
           </a:p>
         </p:txBody>
@@ -18004,13 +18001,6 @@
               </a:rPr>
               <a:t>Comment ASCAT estime le nombre de copies en tenant compte de la cellularité et de la ploïdie?</a:t>
             </a:r>
-            <a:endParaRPr lang="fr-FR" sz="2200" dirty="0">
-              <a:solidFill>
-                <a:schemeClr val="accent1">
-                  <a:lumMod val="50000"/>
-                </a:schemeClr>
-              </a:solidFill>
-            </a:endParaRPr>
           </a:p>
         </p:txBody>
       </p:sp>
@@ -18387,23 +18377,7 @@
             </a:pPr>
             <a:r>
               <a:rPr lang="fr-FR" dirty="0" smtClean="0"/>
-              <a:t>Voici les équations du log </a:t>
-            </a:r>
-            <a:r>
-              <a:rPr lang="fr-FR" dirty="0" smtClean="0"/>
-              <a:t>Ratio et </a:t>
-            </a:r>
-            <a:r>
-              <a:rPr lang="fr-FR" dirty="0" smtClean="0"/>
-              <a:t>du </a:t>
-            </a:r>
-            <a:r>
-              <a:rPr lang="fr-FR" dirty="0" smtClean="0"/>
-              <a:t>BAF. Ces deux paramètres sont </a:t>
-            </a:r>
-            <a:r>
-              <a:rPr lang="fr-FR" dirty="0" smtClean="0"/>
-              <a:t>calculés à partir du nombre de copies de chaque allèle.</a:t>
+              <a:t>Voici les équations du log Ratio et du BAF. Ces deux paramètres sont calculés à partir du nombre de copies de chaque allèle.</a:t>
             </a:r>
             <a:endParaRPr lang="fr-FR" dirty="0"/>
           </a:p>
@@ -18671,13 +18645,6 @@
               </a:rPr>
               <a:t>Comment ASCAT estime le nombre de copies en tenant compte de la cellularité et de la ploïdie?</a:t>
             </a:r>
-            <a:endParaRPr lang="fr-FR" sz="2200" dirty="0">
-              <a:solidFill>
-                <a:schemeClr val="accent1">
-                  <a:lumMod val="50000"/>
-                </a:schemeClr>
-              </a:solidFill>
-            </a:endParaRPr>
           </a:p>
         </p:txBody>
       </p:sp>
@@ -20008,7 +19975,6 @@
               <a:rPr lang="fr-FR" dirty="0"/>
               <a:t>Voici les équations du log Ratio et du BAF. Ces deux paramètres sont calculés à partir du nombre de copies de chaque allèle.</a:t>
             </a:r>
-            <a:endParaRPr lang="fr-FR" dirty="0"/>
           </a:p>
         </p:txBody>
       </p:sp>
@@ -20401,13 +20367,6 @@
               </a:rPr>
               <a:t>Comment ASCAT estime le nombre de copies en tenant compte de la cellularité et de la ploïdie?</a:t>
             </a:r>
-            <a:endParaRPr lang="fr-FR" sz="2200" dirty="0">
-              <a:solidFill>
-                <a:schemeClr val="accent1">
-                  <a:lumMod val="50000"/>
-                </a:schemeClr>
-              </a:solidFill>
-            </a:endParaRPr>
           </a:p>
         </p:txBody>
       </p:sp>
@@ -22145,13 +22104,6 @@
               </a:rPr>
               <a:t>Comment ASCAT estime le nombre de copies en tenant compte de la cellularité et de la ploïdie?</a:t>
             </a:r>
-            <a:endParaRPr lang="fr-FR" sz="2200" dirty="0">
-              <a:solidFill>
-                <a:schemeClr val="accent1">
-                  <a:lumMod val="50000"/>
-                </a:schemeClr>
-              </a:solidFill>
-            </a:endParaRPr>
           </a:p>
         </p:txBody>
       </p:sp>
@@ -23675,13 +23627,6 @@
               </a:rPr>
               <a:t>Comment ASCAT estime le nombre de copies en tenant compte de la cellularité et de la ploïdie?</a:t>
             </a:r>
-            <a:endParaRPr lang="fr-FR" sz="2200" dirty="0">
-              <a:solidFill>
-                <a:schemeClr val="accent1">
-                  <a:lumMod val="50000"/>
-                </a:schemeClr>
-              </a:solidFill>
-            </a:endParaRPr>
           </a:p>
         </p:txBody>
       </p:sp>
@@ -25562,13 +25507,6 @@
               </a:rPr>
               <a:t>Comment ASCAT estime le nombre de copies en tenant compte de la cellularité et de la ploïdie?</a:t>
             </a:r>
-            <a:endParaRPr lang="fr-FR" sz="2200" dirty="0">
-              <a:solidFill>
-                <a:schemeClr val="accent1">
-                  <a:lumMod val="50000"/>
-                </a:schemeClr>
-              </a:solidFill>
-            </a:endParaRPr>
           </a:p>
         </p:txBody>
       </p:sp>
@@ -27459,13 +27397,6 @@
               </a:rPr>
               <a:t>Comment ASCAT estime le nombre de copies en tenant compte de la cellularité et de la ploïdie?</a:t>
             </a:r>
-            <a:endParaRPr lang="fr-FR" sz="2200" dirty="0">
-              <a:solidFill>
-                <a:schemeClr val="accent1">
-                  <a:lumMod val="50000"/>
-                </a:schemeClr>
-              </a:solidFill>
-            </a:endParaRPr>
           </a:p>
         </p:txBody>
       </p:sp>
@@ -29664,13 +29595,6 @@
               </a:rPr>
               <a:t>Comment ASCAT estime le nombre de copies en tenant compte de la cellularité et de la ploïdie?</a:t>
             </a:r>
-            <a:endParaRPr lang="fr-FR" sz="2200" dirty="0">
-              <a:solidFill>
-                <a:schemeClr val="accent1">
-                  <a:lumMod val="50000"/>
-                </a:schemeClr>
-              </a:solidFill>
-            </a:endParaRPr>
           </a:p>
         </p:txBody>
       </p:sp>
@@ -30667,13 +30591,6 @@
               </a:rPr>
               <a:t>Comment ASCAT estime le nombre de copies en tenant compte de la cellularité et de la ploïdie?</a:t>
             </a:r>
-            <a:endParaRPr lang="fr-FR" sz="2200" dirty="0">
-              <a:solidFill>
-                <a:schemeClr val="accent1">
-                  <a:lumMod val="50000"/>
-                </a:schemeClr>
-              </a:solidFill>
-            </a:endParaRPr>
           </a:p>
         </p:txBody>
       </p:sp>
@@ -31613,13 +31530,6 @@
               </a:rPr>
               <a:t>Comment ASCAT estime le nombre de copies en tenant compte de la cellularité et de la ploïdie?</a:t>
             </a:r>
-            <a:endParaRPr lang="fr-FR" sz="2200" dirty="0">
-              <a:solidFill>
-                <a:schemeClr val="accent1">
-                  <a:lumMod val="50000"/>
-                </a:schemeClr>
-              </a:solidFill>
-            </a:endParaRPr>
           </a:p>
         </p:txBody>
       </p:sp>
@@ -32710,13 +32620,6 @@
               </a:rPr>
               <a:t>Comment ASCAT estime le nombre de copies en tenant compte de la cellularité et de la ploïdie?</a:t>
             </a:r>
-            <a:endParaRPr lang="fr-FR" sz="2200" dirty="0">
-              <a:solidFill>
-                <a:schemeClr val="accent1">
-                  <a:lumMod val="50000"/>
-                </a:schemeClr>
-              </a:solidFill>
-            </a:endParaRPr>
           </a:p>
         </p:txBody>
       </p:sp>
@@ -33439,13 +33342,6 @@
               </a:rPr>
               <a:t>Comment ASCAT estime le nombre de copies en tenant compte de la cellularité et de la ploïdie?</a:t>
             </a:r>
-            <a:endParaRPr lang="fr-FR" sz="2200" dirty="0">
-              <a:solidFill>
-                <a:schemeClr val="accent1">
-                  <a:lumMod val="50000"/>
-                </a:schemeClr>
-              </a:solidFill>
-            </a:endParaRPr>
           </a:p>
         </p:txBody>
       </p:sp>
@@ -34294,13 +34190,6 @@
               </a:rPr>
               <a:t>Comment ASCAT estime le nombre de copies en tenant compte de la cellularité et de la ploïdie?</a:t>
             </a:r>
-            <a:endParaRPr lang="fr-FR" sz="2200" dirty="0">
-              <a:solidFill>
-                <a:schemeClr val="accent1">
-                  <a:lumMod val="50000"/>
-                </a:schemeClr>
-              </a:solidFill>
-            </a:endParaRPr>
           </a:p>
         </p:txBody>
       </p:sp>
@@ -35148,13 +35037,6 @@
               </a:rPr>
               <a:t>Comment ASCAT estime le nombre de copies en tenant compte de la cellularité et de la ploïdie?</a:t>
             </a:r>
-            <a:endParaRPr lang="fr-FR" sz="2200" dirty="0">
-              <a:solidFill>
-                <a:schemeClr val="accent1">
-                  <a:lumMod val="50000"/>
-                </a:schemeClr>
-              </a:solidFill>
-            </a:endParaRPr>
           </a:p>
         </p:txBody>
       </p:sp>
@@ -39714,7 +39596,7 @@
         </p:nvSpPr>
         <p:spPr>
           <a:xfrm>
-            <a:off x="685355" y="121449"/>
+            <a:off x="685355" y="481263"/>
             <a:ext cx="8596668" cy="1320800"/>
           </a:xfrm>
         </p:spPr>
@@ -39724,7 +39606,7 @@
           <a:p>
             <a:r>
               <a:rPr lang="fr-FR" dirty="0" smtClean="0"/>
-              <a:t>Conclusion</a:t>
+              <a:t>Calcul de scores</a:t>
             </a:r>
             <a:endParaRPr lang="fr-FR" dirty="0"/>
           </a:p>
@@ -39732,7 +39614,7 @@
       </p:sp>
       <p:sp>
         <p:nvSpPr>
-          <p:cNvPr id="5" name="Espace réservé du contenu 2"/>
+          <p:cNvPr id="17" name="Espace réservé du contenu 4"/>
           <p:cNvSpPr>
             <a:spLocks noGrp="1"/>
           </p:cNvSpPr>
@@ -39742,8 +39624,8 @@
         </p:nvSpPr>
         <p:spPr>
           <a:xfrm>
-            <a:off x="677333" y="1727201"/>
-            <a:ext cx="9896881" cy="4314162"/>
+            <a:off x="677334" y="2160589"/>
+            <a:ext cx="10600266" cy="3880773"/>
           </a:xfrm>
         </p:spPr>
         <p:txBody>
@@ -39752,320 +39634,75 @@
           <a:p>
             <a:r>
               <a:rPr lang="fr-FR" dirty="0" smtClean="0"/>
-              <a:t>Segmentation ASPCF</a:t>
-            </a:r>
-          </a:p>
-          <a:p>
+              <a:t>WGD</a:t>
+            </a:r>
             <a:r>
               <a:rPr lang="fr-FR" dirty="0" smtClean="0"/>
-              <a:t>Estimation ploïdie </a:t>
-            </a:r>
+              <a:t>: Combien de fois le génome a été dupliqué</a:t>
+            </a:r>
+          </a:p>
+          <a:p>
+            <a:r>
+              <a:rPr lang="fr-FR" dirty="0" smtClean="0"/>
+              <a:t>MAPD tumoral: </a:t>
+            </a:r>
+            <a:endParaRPr lang="fr-FR" dirty="0" smtClean="0"/>
+          </a:p>
+          <a:p>
             <a:r>
               <a:rPr lang="fr-FR" dirty="0"/>
-              <a:t>&amp;</a:t>
+              <a:t>score </a:t>
             </a:r>
             <a:r>
               <a:rPr lang="fr-FR" dirty="0" smtClean="0"/>
-              <a:t> cellularité</a:t>
-            </a:r>
-          </a:p>
-          <a:p>
+              <a:t>GI</a:t>
+            </a:r>
             <a:r>
               <a:rPr lang="fr-FR" dirty="0"/>
-              <a:t>Calling </a:t>
+              <a:t> </a:t>
             </a:r>
             <a:r>
               <a:rPr lang="fr-FR" dirty="0" smtClean="0"/>
-              <a:t>ASCAT qui prend en compte la cellularité</a:t>
-            </a:r>
+              <a:t>(</a:t>
+            </a:r>
+            <a:r>
+              <a:rPr lang="fr-FR" dirty="0" err="1"/>
+              <a:t>Genomic</a:t>
+            </a:r>
+            <a:r>
+              <a:rPr lang="fr-FR" dirty="0"/>
+              <a:t> </a:t>
+            </a:r>
+            <a:r>
+              <a:rPr lang="fr-FR" dirty="0" err="1" smtClean="0"/>
+              <a:t>Instability</a:t>
+            </a:r>
+            <a:r>
+              <a:rPr lang="fr-FR" dirty="0" smtClean="0"/>
+              <a:t>): </a:t>
+            </a:r>
+          </a:p>
+          <a:p>
+            <a:r>
+              <a:rPr lang="fr-FR" dirty="0" smtClean="0"/>
+              <a:t>Fraction du génome avec une LOH</a:t>
+            </a:r>
+          </a:p>
+          <a:p>
             <a:endParaRPr lang="fr-FR" dirty="0"/>
           </a:p>
           <a:p>
-            <a:endParaRPr lang="fr-FR" dirty="0" smtClean="0"/>
-          </a:p>
-          <a:p>
-            <a:endParaRPr lang="fr-FR" dirty="0"/>
-          </a:p>
-          <a:p>
-            <a:endParaRPr lang="fr-FR" dirty="0" smtClean="0"/>
-          </a:p>
-          <a:p>
-            <a:pPr marL="0" indent="0">
-              <a:buNone/>
-            </a:pPr>
-            <a:endParaRPr lang="fr-FR" dirty="0" smtClean="0"/>
-          </a:p>
-          <a:p>
-            <a:endParaRPr lang="fr-FR" dirty="0"/>
-          </a:p>
-        </p:txBody>
-      </p:sp>
-      <p:sp>
-        <p:nvSpPr>
-          <p:cNvPr id="19" name="Espace réservé du contenu 3"/>
-          <p:cNvSpPr txBox="1">
-            <a:spLocks/>
-          </p:cNvSpPr>
-          <p:nvPr/>
-        </p:nvSpPr>
-        <p:spPr>
-          <a:xfrm>
-            <a:off x="500870" y="1135151"/>
-            <a:ext cx="10455888" cy="693650"/>
-          </a:xfrm>
-          <a:prstGeom prst="rect">
-            <a:avLst/>
-          </a:prstGeom>
-        </p:spPr>
-        <p:txBody>
-          <a:bodyPr vert="horz" lIns="91440" tIns="45720" rIns="91440" bIns="45720" rtlCol="0">
-            <a:normAutofit/>
-          </a:bodyPr>
-          <a:lstStyle>
-            <a:lvl1pPr marL="342900" indent="-342900" algn="l" defTabSz="457200" rtl="0" eaLnBrk="1" latinLnBrk="0" hangingPunct="1">
-              <a:spcBef>
-                <a:spcPts val="1000"/>
-              </a:spcBef>
-              <a:spcAft>
-                <a:spcPts val="0"/>
-              </a:spcAft>
-              <a:buClr>
-                <a:schemeClr val="accent1"/>
-              </a:buClr>
-              <a:buSzPct val="80000"/>
-              <a:buFont typeface="Wingdings 3" charset="2"/>
-              <a:buChar char=""/>
-              <a:defRPr sz="1800" kern="1200">
-                <a:solidFill>
-                  <a:schemeClr val="tx1">
-                    <a:lumMod val="75000"/>
-                    <a:lumOff val="25000"/>
-                  </a:schemeClr>
-                </a:solidFill>
-                <a:latin typeface="+mn-lt"/>
-                <a:ea typeface="+mn-ea"/>
-                <a:cs typeface="+mn-cs"/>
-              </a:defRPr>
-            </a:lvl1pPr>
-            <a:lvl2pPr marL="742950" indent="-285750" algn="l" defTabSz="457200" rtl="0" eaLnBrk="1" latinLnBrk="0" hangingPunct="1">
-              <a:spcBef>
-                <a:spcPts val="1000"/>
-              </a:spcBef>
-              <a:spcAft>
-                <a:spcPts val="0"/>
-              </a:spcAft>
-              <a:buClr>
-                <a:schemeClr val="accent1"/>
-              </a:buClr>
-              <a:buSzPct val="80000"/>
-              <a:buFont typeface="Wingdings 3" charset="2"/>
-              <a:buChar char=""/>
-              <a:defRPr sz="1600" kern="1200">
-                <a:solidFill>
-                  <a:schemeClr val="tx1">
-                    <a:lumMod val="75000"/>
-                    <a:lumOff val="25000"/>
-                  </a:schemeClr>
-                </a:solidFill>
-                <a:latin typeface="+mn-lt"/>
-                <a:ea typeface="+mn-ea"/>
-                <a:cs typeface="+mn-cs"/>
-              </a:defRPr>
-            </a:lvl2pPr>
-            <a:lvl3pPr marL="1143000" indent="-228600" algn="l" defTabSz="457200" rtl="0" eaLnBrk="1" latinLnBrk="0" hangingPunct="1">
-              <a:spcBef>
-                <a:spcPts val="1000"/>
-              </a:spcBef>
-              <a:spcAft>
-                <a:spcPts val="0"/>
-              </a:spcAft>
-              <a:buClr>
-                <a:schemeClr val="accent1"/>
-              </a:buClr>
-              <a:buSzPct val="80000"/>
-              <a:buFont typeface="Wingdings 3" charset="2"/>
-              <a:buChar char=""/>
-              <a:defRPr sz="1400" kern="1200">
-                <a:solidFill>
-                  <a:schemeClr val="tx1">
-                    <a:lumMod val="75000"/>
-                    <a:lumOff val="25000"/>
-                  </a:schemeClr>
-                </a:solidFill>
-                <a:latin typeface="+mn-lt"/>
-                <a:ea typeface="+mn-ea"/>
-                <a:cs typeface="+mn-cs"/>
-              </a:defRPr>
-            </a:lvl3pPr>
-            <a:lvl4pPr marL="1600200" indent="-228600" algn="l" defTabSz="457200" rtl="0" eaLnBrk="1" latinLnBrk="0" hangingPunct="1">
-              <a:spcBef>
-                <a:spcPts val="1000"/>
-              </a:spcBef>
-              <a:spcAft>
-                <a:spcPts val="0"/>
-              </a:spcAft>
-              <a:buClr>
-                <a:schemeClr val="accent1"/>
-              </a:buClr>
-              <a:buSzPct val="80000"/>
-              <a:buFont typeface="Wingdings 3" charset="2"/>
-              <a:buChar char=""/>
-              <a:defRPr sz="1200" kern="1200">
-                <a:solidFill>
-                  <a:schemeClr val="tx1">
-                    <a:lumMod val="75000"/>
-                    <a:lumOff val="25000"/>
-                  </a:schemeClr>
-                </a:solidFill>
-                <a:latin typeface="+mn-lt"/>
-                <a:ea typeface="+mn-ea"/>
-                <a:cs typeface="+mn-cs"/>
-              </a:defRPr>
-            </a:lvl4pPr>
-            <a:lvl5pPr marL="2057400" indent="-228600" algn="l" defTabSz="457200" rtl="0" eaLnBrk="1" latinLnBrk="0" hangingPunct="1">
-              <a:spcBef>
-                <a:spcPts val="1000"/>
-              </a:spcBef>
-              <a:spcAft>
-                <a:spcPts val="0"/>
-              </a:spcAft>
-              <a:buClr>
-                <a:schemeClr val="accent1"/>
-              </a:buClr>
-              <a:buSzPct val="80000"/>
-              <a:buFont typeface="Wingdings 3" charset="2"/>
-              <a:buChar char=""/>
-              <a:defRPr sz="1200" kern="1200">
-                <a:solidFill>
-                  <a:schemeClr val="tx1">
-                    <a:lumMod val="75000"/>
-                    <a:lumOff val="25000"/>
-                  </a:schemeClr>
-                </a:solidFill>
-                <a:latin typeface="+mn-lt"/>
-                <a:ea typeface="+mn-ea"/>
-                <a:cs typeface="+mn-cs"/>
-              </a:defRPr>
-            </a:lvl5pPr>
-            <a:lvl6pPr marL="2514600" indent="-228600" algn="l" defTabSz="457200" rtl="0" eaLnBrk="1" latinLnBrk="0" hangingPunct="1">
-              <a:spcBef>
-                <a:spcPts val="1000"/>
-              </a:spcBef>
-              <a:spcAft>
-                <a:spcPts val="0"/>
-              </a:spcAft>
-              <a:buClr>
-                <a:schemeClr val="accent1"/>
-              </a:buClr>
-              <a:buSzPct val="80000"/>
-              <a:buFont typeface="Wingdings 3" charset="2"/>
-              <a:buChar char=""/>
-              <a:defRPr sz="1200" kern="1200">
-                <a:solidFill>
-                  <a:schemeClr val="tx1">
-                    <a:lumMod val="75000"/>
-                    <a:lumOff val="25000"/>
-                  </a:schemeClr>
-                </a:solidFill>
-                <a:latin typeface="+mn-lt"/>
-                <a:ea typeface="+mn-ea"/>
-                <a:cs typeface="+mn-cs"/>
-              </a:defRPr>
-            </a:lvl6pPr>
-            <a:lvl7pPr marL="2971800" indent="-228600" algn="l" defTabSz="457200" rtl="0" eaLnBrk="1" latinLnBrk="0" hangingPunct="1">
-              <a:spcBef>
-                <a:spcPts val="1000"/>
-              </a:spcBef>
-              <a:spcAft>
-                <a:spcPts val="0"/>
-              </a:spcAft>
-              <a:buClr>
-                <a:schemeClr val="accent1"/>
-              </a:buClr>
-              <a:buSzPct val="80000"/>
-              <a:buFont typeface="Wingdings 3" charset="2"/>
-              <a:buChar char=""/>
-              <a:defRPr sz="1200" kern="1200">
-                <a:solidFill>
-                  <a:schemeClr val="tx1">
-                    <a:lumMod val="75000"/>
-                    <a:lumOff val="25000"/>
-                  </a:schemeClr>
-                </a:solidFill>
-                <a:latin typeface="+mn-lt"/>
-                <a:ea typeface="+mn-ea"/>
-                <a:cs typeface="+mn-cs"/>
-              </a:defRPr>
-            </a:lvl7pPr>
-            <a:lvl8pPr marL="3429000" indent="-228600" algn="l" defTabSz="457200" rtl="0" eaLnBrk="1" latinLnBrk="0" hangingPunct="1">
-              <a:spcBef>
-                <a:spcPts val="1000"/>
-              </a:spcBef>
-              <a:spcAft>
-                <a:spcPts val="0"/>
-              </a:spcAft>
-              <a:buClr>
-                <a:schemeClr val="accent1"/>
-              </a:buClr>
-              <a:buSzPct val="80000"/>
-              <a:buFont typeface="Wingdings 3" charset="2"/>
-              <a:buChar char=""/>
-              <a:defRPr sz="1200" kern="1200">
-                <a:solidFill>
-                  <a:schemeClr val="tx1">
-                    <a:lumMod val="75000"/>
-                    <a:lumOff val="25000"/>
-                  </a:schemeClr>
-                </a:solidFill>
-                <a:latin typeface="+mn-lt"/>
-                <a:ea typeface="+mn-ea"/>
-                <a:cs typeface="+mn-cs"/>
-              </a:defRPr>
-            </a:lvl8pPr>
-            <a:lvl9pPr marL="3886200" indent="-228600" algn="l" defTabSz="457200" rtl="0" eaLnBrk="1" latinLnBrk="0" hangingPunct="1">
-              <a:spcBef>
-                <a:spcPts val="1000"/>
-              </a:spcBef>
-              <a:spcAft>
-                <a:spcPts val="0"/>
-              </a:spcAft>
-              <a:buClr>
-                <a:schemeClr val="accent1"/>
-              </a:buClr>
-              <a:buSzPct val="80000"/>
-              <a:buFont typeface="Wingdings 3" charset="2"/>
-              <a:buChar char=""/>
-              <a:defRPr sz="1200" kern="1200">
-                <a:solidFill>
-                  <a:schemeClr val="tx1">
-                    <a:lumMod val="75000"/>
-                    <a:lumOff val="25000"/>
-                  </a:schemeClr>
-                </a:solidFill>
-                <a:latin typeface="+mn-lt"/>
-                <a:ea typeface="+mn-ea"/>
-                <a:cs typeface="+mn-cs"/>
-              </a:defRPr>
-            </a:lvl9pPr>
-          </a:lstStyle>
-          <a:p>
-            <a:pPr marL="0" indent="0">
-              <a:buNone/>
-            </a:pPr>
-            <a:endParaRPr lang="fr-FR" sz="2200" dirty="0">
-              <a:solidFill>
-                <a:schemeClr val="accent1">
-                  <a:lumMod val="50000"/>
-                </a:schemeClr>
-              </a:solidFill>
-            </a:endParaRPr>
+            <a:r>
+              <a:rPr lang="fr-FR" dirty="0" smtClean="0"/>
+              <a:t>Beaucoup de métriques ont pour utilité principale de vérifier que le processus s’est déroulé sans accroc.</a:t>
+            </a:r>
           </a:p>
         </p:txBody>
       </p:sp>
     </p:spTree>
     <p:extLst>
       <p:ext uri="{BB962C8B-B14F-4D97-AF65-F5344CB8AC3E}">
-        <p14:creationId xmlns:p14="http://schemas.microsoft.com/office/powerpoint/2010/main" val="143702666"/>
+        <p14:creationId xmlns:p14="http://schemas.microsoft.com/office/powerpoint/2010/main" val="341826920"/>
       </p:ext>
     </p:extLst>
   </p:cSld>
@@ -40101,7 +39738,105 @@
       </p:grpSpPr>
       <p:sp>
         <p:nvSpPr>
-          <p:cNvPr id="3" name="Titre 1"/>
+          <p:cNvPr id="2" name="Titre 1"/>
+          <p:cNvSpPr>
+            <a:spLocks noGrp="1"/>
+          </p:cNvSpPr>
+          <p:nvPr>
+            <p:ph type="title"/>
+          </p:nvPr>
+        </p:nvSpPr>
+        <p:spPr>
+          <a:xfrm>
+            <a:off x="685355" y="121449"/>
+            <a:ext cx="8596668" cy="1320800"/>
+          </a:xfrm>
+        </p:spPr>
+        <p:txBody>
+          <a:bodyPr/>
+          <a:lstStyle/>
+          <a:p>
+            <a:r>
+              <a:rPr lang="fr-FR" dirty="0" smtClean="0"/>
+              <a:t>Conclusion</a:t>
+            </a:r>
+            <a:endParaRPr lang="fr-FR" dirty="0"/>
+          </a:p>
+        </p:txBody>
+      </p:sp>
+      <p:sp>
+        <p:nvSpPr>
+          <p:cNvPr id="5" name="Espace réservé du contenu 2"/>
+          <p:cNvSpPr>
+            <a:spLocks noGrp="1"/>
+          </p:cNvSpPr>
+          <p:nvPr>
+            <p:ph idx="1"/>
+          </p:nvPr>
+        </p:nvSpPr>
+        <p:spPr>
+          <a:xfrm>
+            <a:off x="677333" y="1727201"/>
+            <a:ext cx="9896881" cy="4314162"/>
+          </a:xfrm>
+        </p:spPr>
+        <p:txBody>
+          <a:bodyPr/>
+          <a:lstStyle/>
+          <a:p>
+            <a:r>
+              <a:rPr lang="fr-FR" dirty="0" smtClean="0"/>
+              <a:t>Segmentation ASPCF</a:t>
+            </a:r>
+          </a:p>
+          <a:p>
+            <a:r>
+              <a:rPr lang="fr-FR" dirty="0" smtClean="0"/>
+              <a:t>Estimation ploïdie </a:t>
+            </a:r>
+            <a:r>
+              <a:rPr lang="fr-FR" dirty="0"/>
+              <a:t>&amp;</a:t>
+            </a:r>
+            <a:r>
+              <a:rPr lang="fr-FR" dirty="0" smtClean="0"/>
+              <a:t> cellularité</a:t>
+            </a:r>
+          </a:p>
+          <a:p>
+            <a:r>
+              <a:rPr lang="fr-FR" dirty="0"/>
+              <a:t>Calling </a:t>
+            </a:r>
+            <a:r>
+              <a:rPr lang="fr-FR" dirty="0" smtClean="0"/>
+              <a:t>ASCAT qui prend en compte la cellularité</a:t>
+            </a:r>
+            <a:endParaRPr lang="fr-FR" dirty="0"/>
+          </a:p>
+          <a:p>
+            <a:endParaRPr lang="fr-FR" dirty="0" smtClean="0"/>
+          </a:p>
+          <a:p>
+            <a:endParaRPr lang="fr-FR" dirty="0"/>
+          </a:p>
+          <a:p>
+            <a:endParaRPr lang="fr-FR" dirty="0" smtClean="0"/>
+          </a:p>
+          <a:p>
+            <a:pPr marL="0" indent="0">
+              <a:buNone/>
+            </a:pPr>
+            <a:endParaRPr lang="fr-FR" dirty="0" smtClean="0"/>
+          </a:p>
+          <a:p>
+            <a:endParaRPr lang="fr-FR" dirty="0"/>
+          </a:p>
+        </p:txBody>
+      </p:sp>
+      <p:sp>
+        <p:nvSpPr>
+          <p:cNvPr id="19" name="Espace réservé du contenu 3"/>
           <p:cNvSpPr txBox="1">
             <a:spLocks/>
           </p:cNvSpPr>
@@ -40109,99 +39844,249 @@
         </p:nvSpPr>
         <p:spPr>
           <a:xfrm>
-            <a:off x="1396555" y="2395724"/>
-            <a:ext cx="9967013" cy="2316951"/>
+            <a:off x="500870" y="1135151"/>
+            <a:ext cx="10455888" cy="693650"/>
           </a:xfrm>
           <a:prstGeom prst="rect">
             <a:avLst/>
           </a:prstGeom>
         </p:spPr>
         <p:txBody>
-          <a:bodyPr/>
+          <a:bodyPr vert="horz" lIns="91440" tIns="45720" rIns="91440" bIns="45720" rtlCol="0">
+            <a:normAutofit/>
+          </a:bodyPr>
           <a:lstStyle>
-            <a:lvl1pPr algn="l" defTabSz="457200" rtl="0" eaLnBrk="1" latinLnBrk="0" hangingPunct="1">
-              <a:spcBef>
-                <a:spcPct val="0"/>
-              </a:spcBef>
-              <a:buNone/>
-              <a:defRPr sz="3600" kern="1200">
-                <a:solidFill>
-                  <a:schemeClr val="accent1"/>
-                </a:solidFill>
-                <a:latin typeface="+mj-lt"/>
-                <a:ea typeface="+mj-ea"/>
-                <a:cs typeface="+mj-cs"/>
+            <a:lvl1pPr marL="342900" indent="-342900" algn="l" defTabSz="457200" rtl="0" eaLnBrk="1" latinLnBrk="0" hangingPunct="1">
+              <a:spcBef>
+                <a:spcPts val="1000"/>
+              </a:spcBef>
+              <a:spcAft>
+                <a:spcPts val="0"/>
+              </a:spcAft>
+              <a:buClr>
+                <a:schemeClr val="accent1"/>
+              </a:buClr>
+              <a:buSzPct val="80000"/>
+              <a:buFont typeface="Wingdings 3" charset="2"/>
+              <a:buChar char=""/>
+              <a:defRPr sz="1800" kern="1200">
+                <a:solidFill>
+                  <a:schemeClr val="tx1">
+                    <a:lumMod val="75000"/>
+                    <a:lumOff val="25000"/>
+                  </a:schemeClr>
+                </a:solidFill>
+                <a:latin typeface="+mn-lt"/>
+                <a:ea typeface="+mn-ea"/>
+                <a:cs typeface="+mn-cs"/>
               </a:defRPr>
             </a:lvl1pPr>
-            <a:lvl2pPr eaLnBrk="1" hangingPunct="1">
-              <a:defRPr>
-                <a:solidFill>
-                  <a:schemeClr val="tx2"/>
-                </a:solidFill>
+            <a:lvl2pPr marL="742950" indent="-285750" algn="l" defTabSz="457200" rtl="0" eaLnBrk="1" latinLnBrk="0" hangingPunct="1">
+              <a:spcBef>
+                <a:spcPts val="1000"/>
+              </a:spcBef>
+              <a:spcAft>
+                <a:spcPts val="0"/>
+              </a:spcAft>
+              <a:buClr>
+                <a:schemeClr val="accent1"/>
+              </a:buClr>
+              <a:buSzPct val="80000"/>
+              <a:buFont typeface="Wingdings 3" charset="2"/>
+              <a:buChar char=""/>
+              <a:defRPr sz="1600" kern="1200">
+                <a:solidFill>
+                  <a:schemeClr val="tx1">
+                    <a:lumMod val="75000"/>
+                    <a:lumOff val="25000"/>
+                  </a:schemeClr>
+                </a:solidFill>
+                <a:latin typeface="+mn-lt"/>
+                <a:ea typeface="+mn-ea"/>
+                <a:cs typeface="+mn-cs"/>
               </a:defRPr>
             </a:lvl2pPr>
-            <a:lvl3pPr eaLnBrk="1" hangingPunct="1">
-              <a:defRPr>
-                <a:solidFill>
-                  <a:schemeClr val="tx2"/>
-                </a:solidFill>
+            <a:lvl3pPr marL="1143000" indent="-228600" algn="l" defTabSz="457200" rtl="0" eaLnBrk="1" latinLnBrk="0" hangingPunct="1">
+              <a:spcBef>
+                <a:spcPts val="1000"/>
+              </a:spcBef>
+              <a:spcAft>
+                <a:spcPts val="0"/>
+              </a:spcAft>
+              <a:buClr>
+                <a:schemeClr val="accent1"/>
+              </a:buClr>
+              <a:buSzPct val="80000"/>
+              <a:buFont typeface="Wingdings 3" charset="2"/>
+              <a:buChar char=""/>
+              <a:defRPr sz="1400" kern="1200">
+                <a:solidFill>
+                  <a:schemeClr val="tx1">
+                    <a:lumMod val="75000"/>
+                    <a:lumOff val="25000"/>
+                  </a:schemeClr>
+                </a:solidFill>
+                <a:latin typeface="+mn-lt"/>
+                <a:ea typeface="+mn-ea"/>
+                <a:cs typeface="+mn-cs"/>
               </a:defRPr>
             </a:lvl3pPr>
-            <a:lvl4pPr eaLnBrk="1" hangingPunct="1">
-              <a:defRPr>
-                <a:solidFill>
-                  <a:schemeClr val="tx2"/>
-                </a:solidFill>
+            <a:lvl4pPr marL="1600200" indent="-228600" algn="l" defTabSz="457200" rtl="0" eaLnBrk="1" latinLnBrk="0" hangingPunct="1">
+              <a:spcBef>
+                <a:spcPts val="1000"/>
+              </a:spcBef>
+              <a:spcAft>
+                <a:spcPts val="0"/>
+              </a:spcAft>
+              <a:buClr>
+                <a:schemeClr val="accent1"/>
+              </a:buClr>
+              <a:buSzPct val="80000"/>
+              <a:buFont typeface="Wingdings 3" charset="2"/>
+              <a:buChar char=""/>
+              <a:defRPr sz="1200" kern="1200">
+                <a:solidFill>
+                  <a:schemeClr val="tx1">
+                    <a:lumMod val="75000"/>
+                    <a:lumOff val="25000"/>
+                  </a:schemeClr>
+                </a:solidFill>
+                <a:latin typeface="+mn-lt"/>
+                <a:ea typeface="+mn-ea"/>
+                <a:cs typeface="+mn-cs"/>
               </a:defRPr>
             </a:lvl4pPr>
-            <a:lvl5pPr eaLnBrk="1" hangingPunct="1">
-              <a:defRPr>
-                <a:solidFill>
-                  <a:schemeClr val="tx2"/>
-                </a:solidFill>
+            <a:lvl5pPr marL="2057400" indent="-228600" algn="l" defTabSz="457200" rtl="0" eaLnBrk="1" latinLnBrk="0" hangingPunct="1">
+              <a:spcBef>
+                <a:spcPts val="1000"/>
+              </a:spcBef>
+              <a:spcAft>
+                <a:spcPts val="0"/>
+              </a:spcAft>
+              <a:buClr>
+                <a:schemeClr val="accent1"/>
+              </a:buClr>
+              <a:buSzPct val="80000"/>
+              <a:buFont typeface="Wingdings 3" charset="2"/>
+              <a:buChar char=""/>
+              <a:defRPr sz="1200" kern="1200">
+                <a:solidFill>
+                  <a:schemeClr val="tx1">
+                    <a:lumMod val="75000"/>
+                    <a:lumOff val="25000"/>
+                  </a:schemeClr>
+                </a:solidFill>
+                <a:latin typeface="+mn-lt"/>
+                <a:ea typeface="+mn-ea"/>
+                <a:cs typeface="+mn-cs"/>
               </a:defRPr>
             </a:lvl5pPr>
-            <a:lvl6pPr eaLnBrk="1" hangingPunct="1">
-              <a:defRPr>
-                <a:solidFill>
-                  <a:schemeClr val="tx2"/>
-                </a:solidFill>
+            <a:lvl6pPr marL="2514600" indent="-228600" algn="l" defTabSz="457200" rtl="0" eaLnBrk="1" latinLnBrk="0" hangingPunct="1">
+              <a:spcBef>
+                <a:spcPts val="1000"/>
+              </a:spcBef>
+              <a:spcAft>
+                <a:spcPts val="0"/>
+              </a:spcAft>
+              <a:buClr>
+                <a:schemeClr val="accent1"/>
+              </a:buClr>
+              <a:buSzPct val="80000"/>
+              <a:buFont typeface="Wingdings 3" charset="2"/>
+              <a:buChar char=""/>
+              <a:defRPr sz="1200" kern="1200">
+                <a:solidFill>
+                  <a:schemeClr val="tx1">
+                    <a:lumMod val="75000"/>
+                    <a:lumOff val="25000"/>
+                  </a:schemeClr>
+                </a:solidFill>
+                <a:latin typeface="+mn-lt"/>
+                <a:ea typeface="+mn-ea"/>
+                <a:cs typeface="+mn-cs"/>
               </a:defRPr>
             </a:lvl6pPr>
-            <a:lvl7pPr eaLnBrk="1" hangingPunct="1">
-              <a:defRPr>
-                <a:solidFill>
-                  <a:schemeClr val="tx2"/>
-                </a:solidFill>
+            <a:lvl7pPr marL="2971800" indent="-228600" algn="l" defTabSz="457200" rtl="0" eaLnBrk="1" latinLnBrk="0" hangingPunct="1">
+              <a:spcBef>
+                <a:spcPts val="1000"/>
+              </a:spcBef>
+              <a:spcAft>
+                <a:spcPts val="0"/>
+              </a:spcAft>
+              <a:buClr>
+                <a:schemeClr val="accent1"/>
+              </a:buClr>
+              <a:buSzPct val="80000"/>
+              <a:buFont typeface="Wingdings 3" charset="2"/>
+              <a:buChar char=""/>
+              <a:defRPr sz="1200" kern="1200">
+                <a:solidFill>
+                  <a:schemeClr val="tx1">
+                    <a:lumMod val="75000"/>
+                    <a:lumOff val="25000"/>
+                  </a:schemeClr>
+                </a:solidFill>
+                <a:latin typeface="+mn-lt"/>
+                <a:ea typeface="+mn-ea"/>
+                <a:cs typeface="+mn-cs"/>
               </a:defRPr>
             </a:lvl7pPr>
-            <a:lvl8pPr eaLnBrk="1" hangingPunct="1">
-              <a:defRPr>
-                <a:solidFill>
-                  <a:schemeClr val="tx2"/>
-                </a:solidFill>
+            <a:lvl8pPr marL="3429000" indent="-228600" algn="l" defTabSz="457200" rtl="0" eaLnBrk="1" latinLnBrk="0" hangingPunct="1">
+              <a:spcBef>
+                <a:spcPts val="1000"/>
+              </a:spcBef>
+              <a:spcAft>
+                <a:spcPts val="0"/>
+              </a:spcAft>
+              <a:buClr>
+                <a:schemeClr val="accent1"/>
+              </a:buClr>
+              <a:buSzPct val="80000"/>
+              <a:buFont typeface="Wingdings 3" charset="2"/>
+              <a:buChar char=""/>
+              <a:defRPr sz="1200" kern="1200">
+                <a:solidFill>
+                  <a:schemeClr val="tx1">
+                    <a:lumMod val="75000"/>
+                    <a:lumOff val="25000"/>
+                  </a:schemeClr>
+                </a:solidFill>
+                <a:latin typeface="+mn-lt"/>
+                <a:ea typeface="+mn-ea"/>
+                <a:cs typeface="+mn-cs"/>
               </a:defRPr>
             </a:lvl8pPr>
-            <a:lvl9pPr eaLnBrk="1" hangingPunct="1">
-              <a:defRPr>
-                <a:solidFill>
-                  <a:schemeClr val="tx2"/>
-                </a:solidFill>
+            <a:lvl9pPr marL="3886200" indent="-228600" algn="l" defTabSz="457200" rtl="0" eaLnBrk="1" latinLnBrk="0" hangingPunct="1">
+              <a:spcBef>
+                <a:spcPts val="1000"/>
+              </a:spcBef>
+              <a:spcAft>
+                <a:spcPts val="0"/>
+              </a:spcAft>
+              <a:buClr>
+                <a:schemeClr val="accent1"/>
+              </a:buClr>
+              <a:buSzPct val="80000"/>
+              <a:buFont typeface="Wingdings 3" charset="2"/>
+              <a:buChar char=""/>
+              <a:defRPr sz="1200" kern="1200">
+                <a:solidFill>
+                  <a:schemeClr val="tx1">
+                    <a:lumMod val="75000"/>
+                    <a:lumOff val="25000"/>
+                  </a:schemeClr>
+                </a:solidFill>
+                <a:latin typeface="+mn-lt"/>
+                <a:ea typeface="+mn-ea"/>
+                <a:cs typeface="+mn-cs"/>
               </a:defRPr>
             </a:lvl9pPr>
           </a:lstStyle>
           <a:p>
-            <a:r>
-              <a:rPr lang="fr-FR" sz="5000" dirty="0" smtClean="0">
-                <a:solidFill>
-                  <a:schemeClr val="accent1">
-                    <a:lumMod val="50000"/>
-                  </a:schemeClr>
-                </a:solidFill>
-              </a:rPr>
-              <a:t>Merci pour votre attention!</a:t>
-            </a:r>
-            <a:endParaRPr lang="fr-FR" sz="5000" dirty="0">
+            <a:pPr marL="0" indent="0">
+              <a:buNone/>
+            </a:pPr>
+            <a:endParaRPr lang="fr-FR" sz="2200" dirty="0">
               <a:solidFill>
                 <a:schemeClr val="accent1">
                   <a:lumMod val="50000"/>
@@ -40214,13 +40099,20 @@
     </p:spTree>
     <p:extLst>
       <p:ext uri="{BB962C8B-B14F-4D97-AF65-F5344CB8AC3E}">
-        <p14:creationId xmlns:p14="http://schemas.microsoft.com/office/powerpoint/2010/main" val="54627143"/>
+        <p14:creationId xmlns:p14="http://schemas.microsoft.com/office/powerpoint/2010/main" val="143702666"/>
       </p:ext>
     </p:extLst>
   </p:cSld>
   <p:clrMapOvr>
     <a:masterClrMapping/>
   </p:clrMapOvr>
+  <p:timing>
+    <p:tnLst>
+      <p:par>
+        <p:cTn id="1" dur="indefinite" restart="never" nodeType="tmRoot"/>
+      </p:par>
+    </p:tnLst>
+  </p:timing>
 </p:sld>
 </file>
 
@@ -40243,139 +40135,7 @@
       </p:grpSpPr>
       <p:sp>
         <p:nvSpPr>
-          <p:cNvPr id="2" name="Titre 1"/>
-          <p:cNvSpPr>
-            <a:spLocks noGrp="1"/>
-          </p:cNvSpPr>
-          <p:nvPr>
-            <p:ph type="title"/>
-          </p:nvPr>
-        </p:nvSpPr>
-        <p:spPr>
-          <a:xfrm>
-            <a:off x="685355" y="121449"/>
-            <a:ext cx="8596668" cy="1320800"/>
-          </a:xfrm>
-        </p:spPr>
-        <p:txBody>
-          <a:bodyPr/>
-          <a:lstStyle/>
-          <a:p>
-            <a:r>
-              <a:rPr lang="fr-FR" dirty="0" smtClean="0"/>
-              <a:t>Résultats</a:t>
-            </a:r>
-            <a:endParaRPr lang="fr-FR" dirty="0"/>
-          </a:p>
-        </p:txBody>
-      </p:sp>
-      <p:sp>
-        <p:nvSpPr>
-          <p:cNvPr id="5" name="Espace réservé du contenu 2"/>
-          <p:cNvSpPr>
-            <a:spLocks noGrp="1"/>
-          </p:cNvSpPr>
-          <p:nvPr>
-            <p:ph idx="1"/>
-          </p:nvPr>
-        </p:nvSpPr>
-        <p:spPr>
-          <a:xfrm>
-            <a:off x="677333" y="1727201"/>
-            <a:ext cx="9896881" cy="4314162"/>
-          </a:xfrm>
-        </p:spPr>
-        <p:txBody>
-          <a:bodyPr/>
-          <a:lstStyle/>
-          <a:p>
-            <a:r>
-              <a:rPr lang="fr-FR" dirty="0" smtClean="0"/>
-              <a:t>MAPD</a:t>
-            </a:r>
-          </a:p>
-          <a:p>
-            <a:r>
-              <a:rPr lang="fr-FR" dirty="0" smtClean="0"/>
-              <a:t>Nombre de SNP hétérozygotes</a:t>
-            </a:r>
-          </a:p>
-          <a:p>
-            <a:r>
-              <a:rPr lang="fr-FR" dirty="0" smtClean="0"/>
-              <a:t>Proportion de sondes tumorales homozygotes</a:t>
-            </a:r>
-          </a:p>
-          <a:p>
-            <a:r>
-              <a:rPr lang="fr-FR" dirty="0" smtClean="0"/>
-              <a:t>Fraction du génome ayant une délétion homozygote</a:t>
-            </a:r>
-          </a:p>
-          <a:p>
-            <a:r>
-              <a:rPr lang="fr-FR" dirty="0"/>
-              <a:t>Fraction du génome ayant </a:t>
-            </a:r>
-            <a:r>
-              <a:rPr lang="fr-FR" dirty="0" smtClean="0"/>
-              <a:t>une LOH</a:t>
-            </a:r>
-          </a:p>
-          <a:p>
-            <a:r>
-              <a:rPr lang="fr-FR" dirty="0" err="1" smtClean="0"/>
-              <a:t>Whole</a:t>
-            </a:r>
-            <a:r>
-              <a:rPr lang="fr-FR" dirty="0" smtClean="0"/>
-              <a:t> </a:t>
-            </a:r>
-            <a:r>
-              <a:rPr lang="fr-FR" dirty="0" err="1" smtClean="0"/>
-              <a:t>Genome</a:t>
-            </a:r>
-            <a:r>
-              <a:rPr lang="fr-FR" dirty="0" smtClean="0"/>
-              <a:t> </a:t>
-            </a:r>
-            <a:r>
-              <a:rPr lang="fr-FR" dirty="0" err="1" smtClean="0"/>
-              <a:t>Doubling</a:t>
-            </a:r>
-            <a:r>
-              <a:rPr lang="fr-FR" dirty="0" smtClean="0"/>
-              <a:t> </a:t>
-            </a:r>
-            <a:r>
-              <a:rPr lang="fr-FR" dirty="0" err="1" smtClean="0"/>
-              <a:t>event</a:t>
-            </a:r>
-            <a:r>
-              <a:rPr lang="fr-FR" dirty="0" smtClean="0"/>
-              <a:t> (WGD)</a:t>
-            </a:r>
-          </a:p>
-          <a:p>
-            <a:endParaRPr lang="fr-FR" dirty="0"/>
-          </a:p>
-          <a:p>
-            <a:endParaRPr lang="fr-FR" dirty="0" smtClean="0"/>
-          </a:p>
-          <a:p>
-            <a:pPr marL="0" indent="0">
-              <a:buNone/>
-            </a:pPr>
-            <a:endParaRPr lang="fr-FR" dirty="0" smtClean="0"/>
-          </a:p>
-          <a:p>
-            <a:endParaRPr lang="fr-FR" dirty="0"/>
-          </a:p>
-        </p:txBody>
-      </p:sp>
-      <p:sp>
-        <p:nvSpPr>
-          <p:cNvPr id="19" name="Espace réservé du contenu 3"/>
+          <p:cNvPr id="3" name="Titre 1"/>
           <p:cNvSpPr txBox="1">
             <a:spLocks/>
           </p:cNvSpPr>
@@ -40383,259 +40143,99 @@
         </p:nvSpPr>
         <p:spPr>
           <a:xfrm>
-            <a:off x="500870" y="1135151"/>
-            <a:ext cx="10455888" cy="693650"/>
+            <a:off x="1396555" y="2395724"/>
+            <a:ext cx="9967013" cy="2316951"/>
           </a:xfrm>
           <a:prstGeom prst="rect">
             <a:avLst/>
           </a:prstGeom>
         </p:spPr>
         <p:txBody>
-          <a:bodyPr vert="horz" lIns="91440" tIns="45720" rIns="91440" bIns="45720" rtlCol="0">
-            <a:normAutofit/>
-          </a:bodyPr>
+          <a:bodyPr/>
           <a:lstStyle>
-            <a:lvl1pPr marL="342900" indent="-342900" algn="l" defTabSz="457200" rtl="0" eaLnBrk="1" latinLnBrk="0" hangingPunct="1">
-              <a:spcBef>
-                <a:spcPts val="1000"/>
-              </a:spcBef>
-              <a:spcAft>
-                <a:spcPts val="0"/>
-              </a:spcAft>
-              <a:buClr>
-                <a:schemeClr val="accent1"/>
-              </a:buClr>
-              <a:buSzPct val="80000"/>
-              <a:buFont typeface="Wingdings 3" charset="2"/>
-              <a:buChar char=""/>
-              <a:defRPr sz="1800" kern="1200">
-                <a:solidFill>
-                  <a:schemeClr val="tx1">
-                    <a:lumMod val="75000"/>
-                    <a:lumOff val="25000"/>
-                  </a:schemeClr>
-                </a:solidFill>
-                <a:latin typeface="+mn-lt"/>
-                <a:ea typeface="+mn-ea"/>
-                <a:cs typeface="+mn-cs"/>
+            <a:lvl1pPr algn="l" defTabSz="457200" rtl="0" eaLnBrk="1" latinLnBrk="0" hangingPunct="1">
+              <a:spcBef>
+                <a:spcPct val="0"/>
+              </a:spcBef>
+              <a:buNone/>
+              <a:defRPr sz="3600" kern="1200">
+                <a:solidFill>
+                  <a:schemeClr val="accent1"/>
+                </a:solidFill>
+                <a:latin typeface="+mj-lt"/>
+                <a:ea typeface="+mj-ea"/>
+                <a:cs typeface="+mj-cs"/>
               </a:defRPr>
             </a:lvl1pPr>
-            <a:lvl2pPr marL="742950" indent="-285750" algn="l" defTabSz="457200" rtl="0" eaLnBrk="1" latinLnBrk="0" hangingPunct="1">
-              <a:spcBef>
-                <a:spcPts val="1000"/>
-              </a:spcBef>
-              <a:spcAft>
-                <a:spcPts val="0"/>
-              </a:spcAft>
-              <a:buClr>
-                <a:schemeClr val="accent1"/>
-              </a:buClr>
-              <a:buSzPct val="80000"/>
-              <a:buFont typeface="Wingdings 3" charset="2"/>
-              <a:buChar char=""/>
-              <a:defRPr sz="1600" kern="1200">
-                <a:solidFill>
-                  <a:schemeClr val="tx1">
-                    <a:lumMod val="75000"/>
-                    <a:lumOff val="25000"/>
-                  </a:schemeClr>
-                </a:solidFill>
-                <a:latin typeface="+mn-lt"/>
-                <a:ea typeface="+mn-ea"/>
-                <a:cs typeface="+mn-cs"/>
+            <a:lvl2pPr eaLnBrk="1" hangingPunct="1">
+              <a:defRPr>
+                <a:solidFill>
+                  <a:schemeClr val="tx2"/>
+                </a:solidFill>
               </a:defRPr>
             </a:lvl2pPr>
-            <a:lvl3pPr marL="1143000" indent="-228600" algn="l" defTabSz="457200" rtl="0" eaLnBrk="1" latinLnBrk="0" hangingPunct="1">
-              <a:spcBef>
-                <a:spcPts val="1000"/>
-              </a:spcBef>
-              <a:spcAft>
-                <a:spcPts val="0"/>
-              </a:spcAft>
-              <a:buClr>
-                <a:schemeClr val="accent1"/>
-              </a:buClr>
-              <a:buSzPct val="80000"/>
-              <a:buFont typeface="Wingdings 3" charset="2"/>
-              <a:buChar char=""/>
-              <a:defRPr sz="1400" kern="1200">
-                <a:solidFill>
-                  <a:schemeClr val="tx1">
-                    <a:lumMod val="75000"/>
-                    <a:lumOff val="25000"/>
-                  </a:schemeClr>
-                </a:solidFill>
-                <a:latin typeface="+mn-lt"/>
-                <a:ea typeface="+mn-ea"/>
-                <a:cs typeface="+mn-cs"/>
+            <a:lvl3pPr eaLnBrk="1" hangingPunct="1">
+              <a:defRPr>
+                <a:solidFill>
+                  <a:schemeClr val="tx2"/>
+                </a:solidFill>
               </a:defRPr>
             </a:lvl3pPr>
-            <a:lvl4pPr marL="1600200" indent="-228600" algn="l" defTabSz="457200" rtl="0" eaLnBrk="1" latinLnBrk="0" hangingPunct="1">
-              <a:spcBef>
-                <a:spcPts val="1000"/>
-              </a:spcBef>
-              <a:spcAft>
-                <a:spcPts val="0"/>
-              </a:spcAft>
-              <a:buClr>
-                <a:schemeClr val="accent1"/>
-              </a:buClr>
-              <a:buSzPct val="80000"/>
-              <a:buFont typeface="Wingdings 3" charset="2"/>
-              <a:buChar char=""/>
-              <a:defRPr sz="1200" kern="1200">
-                <a:solidFill>
-                  <a:schemeClr val="tx1">
-                    <a:lumMod val="75000"/>
-                    <a:lumOff val="25000"/>
-                  </a:schemeClr>
-                </a:solidFill>
-                <a:latin typeface="+mn-lt"/>
-                <a:ea typeface="+mn-ea"/>
-                <a:cs typeface="+mn-cs"/>
+            <a:lvl4pPr eaLnBrk="1" hangingPunct="1">
+              <a:defRPr>
+                <a:solidFill>
+                  <a:schemeClr val="tx2"/>
+                </a:solidFill>
               </a:defRPr>
             </a:lvl4pPr>
-            <a:lvl5pPr marL="2057400" indent="-228600" algn="l" defTabSz="457200" rtl="0" eaLnBrk="1" latinLnBrk="0" hangingPunct="1">
-              <a:spcBef>
-                <a:spcPts val="1000"/>
-              </a:spcBef>
-              <a:spcAft>
-                <a:spcPts val="0"/>
-              </a:spcAft>
-              <a:buClr>
-                <a:schemeClr val="accent1"/>
-              </a:buClr>
-              <a:buSzPct val="80000"/>
-              <a:buFont typeface="Wingdings 3" charset="2"/>
-              <a:buChar char=""/>
-              <a:defRPr sz="1200" kern="1200">
-                <a:solidFill>
-                  <a:schemeClr val="tx1">
-                    <a:lumMod val="75000"/>
-                    <a:lumOff val="25000"/>
-                  </a:schemeClr>
-                </a:solidFill>
-                <a:latin typeface="+mn-lt"/>
-                <a:ea typeface="+mn-ea"/>
-                <a:cs typeface="+mn-cs"/>
+            <a:lvl5pPr eaLnBrk="1" hangingPunct="1">
+              <a:defRPr>
+                <a:solidFill>
+                  <a:schemeClr val="tx2"/>
+                </a:solidFill>
               </a:defRPr>
             </a:lvl5pPr>
-            <a:lvl6pPr marL="2514600" indent="-228600" algn="l" defTabSz="457200" rtl="0" eaLnBrk="1" latinLnBrk="0" hangingPunct="1">
-              <a:spcBef>
-                <a:spcPts val="1000"/>
-              </a:spcBef>
-              <a:spcAft>
-                <a:spcPts val="0"/>
-              </a:spcAft>
-              <a:buClr>
-                <a:schemeClr val="accent1"/>
-              </a:buClr>
-              <a:buSzPct val="80000"/>
-              <a:buFont typeface="Wingdings 3" charset="2"/>
-              <a:buChar char=""/>
-              <a:defRPr sz="1200" kern="1200">
-                <a:solidFill>
-                  <a:schemeClr val="tx1">
-                    <a:lumMod val="75000"/>
-                    <a:lumOff val="25000"/>
-                  </a:schemeClr>
-                </a:solidFill>
-                <a:latin typeface="+mn-lt"/>
-                <a:ea typeface="+mn-ea"/>
-                <a:cs typeface="+mn-cs"/>
+            <a:lvl6pPr eaLnBrk="1" hangingPunct="1">
+              <a:defRPr>
+                <a:solidFill>
+                  <a:schemeClr val="tx2"/>
+                </a:solidFill>
               </a:defRPr>
             </a:lvl6pPr>
-            <a:lvl7pPr marL="2971800" indent="-228600" algn="l" defTabSz="457200" rtl="0" eaLnBrk="1" latinLnBrk="0" hangingPunct="1">
-              <a:spcBef>
-                <a:spcPts val="1000"/>
-              </a:spcBef>
-              <a:spcAft>
-                <a:spcPts val="0"/>
-              </a:spcAft>
-              <a:buClr>
-                <a:schemeClr val="accent1"/>
-              </a:buClr>
-              <a:buSzPct val="80000"/>
-              <a:buFont typeface="Wingdings 3" charset="2"/>
-              <a:buChar char=""/>
-              <a:defRPr sz="1200" kern="1200">
-                <a:solidFill>
-                  <a:schemeClr val="tx1">
-                    <a:lumMod val="75000"/>
-                    <a:lumOff val="25000"/>
-                  </a:schemeClr>
-                </a:solidFill>
-                <a:latin typeface="+mn-lt"/>
-                <a:ea typeface="+mn-ea"/>
-                <a:cs typeface="+mn-cs"/>
+            <a:lvl7pPr eaLnBrk="1" hangingPunct="1">
+              <a:defRPr>
+                <a:solidFill>
+                  <a:schemeClr val="tx2"/>
+                </a:solidFill>
               </a:defRPr>
             </a:lvl7pPr>
-            <a:lvl8pPr marL="3429000" indent="-228600" algn="l" defTabSz="457200" rtl="0" eaLnBrk="1" latinLnBrk="0" hangingPunct="1">
-              <a:spcBef>
-                <a:spcPts val="1000"/>
-              </a:spcBef>
-              <a:spcAft>
-                <a:spcPts val="0"/>
-              </a:spcAft>
-              <a:buClr>
-                <a:schemeClr val="accent1"/>
-              </a:buClr>
-              <a:buSzPct val="80000"/>
-              <a:buFont typeface="Wingdings 3" charset="2"/>
-              <a:buChar char=""/>
-              <a:defRPr sz="1200" kern="1200">
-                <a:solidFill>
-                  <a:schemeClr val="tx1">
-                    <a:lumMod val="75000"/>
-                    <a:lumOff val="25000"/>
-                  </a:schemeClr>
-                </a:solidFill>
-                <a:latin typeface="+mn-lt"/>
-                <a:ea typeface="+mn-ea"/>
-                <a:cs typeface="+mn-cs"/>
+            <a:lvl8pPr eaLnBrk="1" hangingPunct="1">
+              <a:defRPr>
+                <a:solidFill>
+                  <a:schemeClr val="tx2"/>
+                </a:solidFill>
               </a:defRPr>
             </a:lvl8pPr>
-            <a:lvl9pPr marL="3886200" indent="-228600" algn="l" defTabSz="457200" rtl="0" eaLnBrk="1" latinLnBrk="0" hangingPunct="1">
-              <a:spcBef>
-                <a:spcPts val="1000"/>
-              </a:spcBef>
-              <a:spcAft>
-                <a:spcPts val="0"/>
-              </a:spcAft>
-              <a:buClr>
-                <a:schemeClr val="accent1"/>
-              </a:buClr>
-              <a:buSzPct val="80000"/>
-              <a:buFont typeface="Wingdings 3" charset="2"/>
-              <a:buChar char=""/>
-              <a:defRPr sz="1200" kern="1200">
-                <a:solidFill>
-                  <a:schemeClr val="tx1">
-                    <a:lumMod val="75000"/>
-                    <a:lumOff val="25000"/>
-                  </a:schemeClr>
-                </a:solidFill>
-                <a:latin typeface="+mn-lt"/>
-                <a:ea typeface="+mn-ea"/>
-                <a:cs typeface="+mn-cs"/>
+            <a:lvl9pPr eaLnBrk="1" hangingPunct="1">
+              <a:defRPr>
+                <a:solidFill>
+                  <a:schemeClr val="tx2"/>
+                </a:solidFill>
               </a:defRPr>
             </a:lvl9pPr>
           </a:lstStyle>
           <a:p>
-            <a:pPr marL="0" indent="0">
-              <a:buNone/>
-            </a:pPr>
-            <a:r>
-              <a:rPr lang="fr-FR" sz="2200" dirty="0" smtClean="0">
+            <a:r>
+              <a:rPr lang="fr-FR" sz="5000" dirty="0" smtClean="0">
                 <a:solidFill>
                   <a:schemeClr val="accent1">
                     <a:lumMod val="50000"/>
                   </a:schemeClr>
                 </a:solidFill>
               </a:rPr>
-              <a:t>Métriques</a:t>
-            </a:r>
-            <a:endParaRPr lang="fr-FR" sz="2200" dirty="0">
+              <a:t>Merci pour votre attention!</a:t>
+            </a:r>
+            <a:endParaRPr lang="fr-FR" sz="5000" dirty="0">
               <a:solidFill>
                 <a:schemeClr val="accent1">
                   <a:lumMod val="50000"/>
@@ -40648,20 +40248,13 @@
     </p:spTree>
     <p:extLst>
       <p:ext uri="{BB962C8B-B14F-4D97-AF65-F5344CB8AC3E}">
-        <p14:creationId xmlns:p14="http://schemas.microsoft.com/office/powerpoint/2010/main" val="1940381778"/>
+        <p14:creationId xmlns:p14="http://schemas.microsoft.com/office/powerpoint/2010/main" val="54627143"/>
       </p:ext>
     </p:extLst>
   </p:cSld>
   <p:clrMapOvr>
     <a:masterClrMapping/>
   </p:clrMapOvr>
-  <p:timing>
-    <p:tnLst>
-      <p:par>
-        <p:cTn id="1" dur="indefinite" restart="never" nodeType="tmRoot"/>
-      </p:par>
-    </p:tnLst>
-  </p:timing>
 </p:sld>
 </file>
 
@@ -42384,6 +41977,451 @@
     <p:extLst>
       <p:ext uri="{BB962C8B-B14F-4D97-AF65-F5344CB8AC3E}">
         <p14:creationId xmlns:p14="http://schemas.microsoft.com/office/powerpoint/2010/main" val="2741223904"/>
+      </p:ext>
+    </p:extLst>
+  </p:cSld>
+  <p:clrMapOvr>
+    <a:masterClrMapping/>
+  </p:clrMapOvr>
+  <p:timing>
+    <p:tnLst>
+      <p:par>
+        <p:cTn id="1" dur="indefinite" restart="never" nodeType="tmRoot"/>
+      </p:par>
+    </p:tnLst>
+  </p:timing>
+</p:sld>
+</file>
+
+<file path=ppt/slides/slide48.xml><?xml version="1.0" encoding="utf-8"?>
+<p:sld xmlns:a="http://schemas.openxmlformats.org/drawingml/2006/main" xmlns:r="http://schemas.openxmlformats.org/officeDocument/2006/relationships" xmlns:p="http://schemas.openxmlformats.org/presentationml/2006/main">
+  <p:cSld>
+    <p:spTree>
+      <p:nvGrpSpPr>
+        <p:cNvPr id="1" name=""/>
+        <p:cNvGrpSpPr/>
+        <p:nvPr/>
+      </p:nvGrpSpPr>
+      <p:grpSpPr>
+        <a:xfrm>
+          <a:off x="0" y="0"/>
+          <a:ext cx="0" cy="0"/>
+          <a:chOff x="0" y="0"/>
+          <a:chExt cx="0" cy="0"/>
+        </a:xfrm>
+      </p:grpSpPr>
+      <p:sp>
+        <p:nvSpPr>
+          <p:cNvPr id="2" name="Titre 1"/>
+          <p:cNvSpPr>
+            <a:spLocks noGrp="1"/>
+          </p:cNvSpPr>
+          <p:nvPr>
+            <p:ph type="title"/>
+          </p:nvPr>
+        </p:nvSpPr>
+        <p:spPr>
+          <a:xfrm>
+            <a:off x="685355" y="121449"/>
+            <a:ext cx="8596668" cy="1320800"/>
+          </a:xfrm>
+        </p:spPr>
+        <p:txBody>
+          <a:bodyPr/>
+          <a:lstStyle/>
+          <a:p>
+            <a:r>
+              <a:rPr lang="fr-FR" dirty="0" smtClean="0"/>
+              <a:t>Résultats</a:t>
+            </a:r>
+            <a:endParaRPr lang="fr-FR" dirty="0"/>
+          </a:p>
+        </p:txBody>
+      </p:sp>
+      <p:sp>
+        <p:nvSpPr>
+          <p:cNvPr id="5" name="Espace réservé du contenu 2"/>
+          <p:cNvSpPr>
+            <a:spLocks noGrp="1"/>
+          </p:cNvSpPr>
+          <p:nvPr>
+            <p:ph idx="1"/>
+          </p:nvPr>
+        </p:nvSpPr>
+        <p:spPr>
+          <a:xfrm>
+            <a:off x="677333" y="1727201"/>
+            <a:ext cx="9896881" cy="4314162"/>
+          </a:xfrm>
+        </p:spPr>
+        <p:txBody>
+          <a:bodyPr/>
+          <a:lstStyle/>
+          <a:p>
+            <a:r>
+              <a:rPr lang="fr-FR" dirty="0" smtClean="0"/>
+              <a:t>MAPD</a:t>
+            </a:r>
+          </a:p>
+          <a:p>
+            <a:r>
+              <a:rPr lang="fr-FR" dirty="0" smtClean="0"/>
+              <a:t>Nombre de SNP hétérozygotes</a:t>
+            </a:r>
+          </a:p>
+          <a:p>
+            <a:r>
+              <a:rPr lang="fr-FR" dirty="0" smtClean="0"/>
+              <a:t>Proportion de sondes tumorales homozygotes</a:t>
+            </a:r>
+          </a:p>
+          <a:p>
+            <a:r>
+              <a:rPr lang="fr-FR" dirty="0" smtClean="0"/>
+              <a:t>Fraction du génome ayant une délétion homozygote</a:t>
+            </a:r>
+          </a:p>
+          <a:p>
+            <a:r>
+              <a:rPr lang="fr-FR" dirty="0"/>
+              <a:t>Fraction du génome ayant </a:t>
+            </a:r>
+            <a:r>
+              <a:rPr lang="fr-FR" dirty="0" smtClean="0"/>
+              <a:t>une LOH</a:t>
+            </a:r>
+          </a:p>
+          <a:p>
+            <a:r>
+              <a:rPr lang="fr-FR" dirty="0" err="1" smtClean="0"/>
+              <a:t>Whole</a:t>
+            </a:r>
+            <a:r>
+              <a:rPr lang="fr-FR" dirty="0" smtClean="0"/>
+              <a:t> </a:t>
+            </a:r>
+            <a:r>
+              <a:rPr lang="fr-FR" dirty="0" err="1" smtClean="0"/>
+              <a:t>Genome</a:t>
+            </a:r>
+            <a:r>
+              <a:rPr lang="fr-FR" dirty="0" smtClean="0"/>
+              <a:t> </a:t>
+            </a:r>
+            <a:r>
+              <a:rPr lang="fr-FR" dirty="0" err="1" smtClean="0"/>
+              <a:t>Doubling</a:t>
+            </a:r>
+            <a:r>
+              <a:rPr lang="fr-FR" dirty="0" smtClean="0"/>
+              <a:t> </a:t>
+            </a:r>
+            <a:r>
+              <a:rPr lang="fr-FR" dirty="0" err="1" smtClean="0"/>
+              <a:t>event</a:t>
+            </a:r>
+            <a:r>
+              <a:rPr lang="fr-FR" dirty="0" smtClean="0"/>
+              <a:t> (WGD</a:t>
+            </a:r>
+            <a:r>
+              <a:rPr lang="fr-FR" dirty="0" smtClean="0"/>
+              <a:t>)</a:t>
+            </a:r>
+          </a:p>
+          <a:p>
+            <a:endParaRPr lang="fr-FR" dirty="0"/>
+          </a:p>
+          <a:p>
+            <a:endParaRPr lang="fr-FR" dirty="0" smtClean="0"/>
+          </a:p>
+          <a:p>
+            <a:pPr marL="0" indent="0">
+              <a:buNone/>
+            </a:pPr>
+            <a:endParaRPr lang="fr-FR" dirty="0" smtClean="0"/>
+          </a:p>
+          <a:p>
+            <a:endParaRPr lang="fr-FR" dirty="0"/>
+          </a:p>
+        </p:txBody>
+      </p:sp>
+      <p:sp>
+        <p:nvSpPr>
+          <p:cNvPr id="19" name="Espace réservé du contenu 3"/>
+          <p:cNvSpPr txBox="1">
+            <a:spLocks/>
+          </p:cNvSpPr>
+          <p:nvPr/>
+        </p:nvSpPr>
+        <p:spPr>
+          <a:xfrm>
+            <a:off x="500870" y="1135151"/>
+            <a:ext cx="10455888" cy="693650"/>
+          </a:xfrm>
+          <a:prstGeom prst="rect">
+            <a:avLst/>
+          </a:prstGeom>
+        </p:spPr>
+        <p:txBody>
+          <a:bodyPr vert="horz" lIns="91440" tIns="45720" rIns="91440" bIns="45720" rtlCol="0">
+            <a:normAutofit/>
+          </a:bodyPr>
+          <a:lstStyle>
+            <a:lvl1pPr marL="342900" indent="-342900" algn="l" defTabSz="457200" rtl="0" eaLnBrk="1" latinLnBrk="0" hangingPunct="1">
+              <a:spcBef>
+                <a:spcPts val="1000"/>
+              </a:spcBef>
+              <a:spcAft>
+                <a:spcPts val="0"/>
+              </a:spcAft>
+              <a:buClr>
+                <a:schemeClr val="accent1"/>
+              </a:buClr>
+              <a:buSzPct val="80000"/>
+              <a:buFont typeface="Wingdings 3" charset="2"/>
+              <a:buChar char=""/>
+              <a:defRPr sz="1800" kern="1200">
+                <a:solidFill>
+                  <a:schemeClr val="tx1">
+                    <a:lumMod val="75000"/>
+                    <a:lumOff val="25000"/>
+                  </a:schemeClr>
+                </a:solidFill>
+                <a:latin typeface="+mn-lt"/>
+                <a:ea typeface="+mn-ea"/>
+                <a:cs typeface="+mn-cs"/>
+              </a:defRPr>
+            </a:lvl1pPr>
+            <a:lvl2pPr marL="742950" indent="-285750" algn="l" defTabSz="457200" rtl="0" eaLnBrk="1" latinLnBrk="0" hangingPunct="1">
+              <a:spcBef>
+                <a:spcPts val="1000"/>
+              </a:spcBef>
+              <a:spcAft>
+                <a:spcPts val="0"/>
+              </a:spcAft>
+              <a:buClr>
+                <a:schemeClr val="accent1"/>
+              </a:buClr>
+              <a:buSzPct val="80000"/>
+              <a:buFont typeface="Wingdings 3" charset="2"/>
+              <a:buChar char=""/>
+              <a:defRPr sz="1600" kern="1200">
+                <a:solidFill>
+                  <a:schemeClr val="tx1">
+                    <a:lumMod val="75000"/>
+                    <a:lumOff val="25000"/>
+                  </a:schemeClr>
+                </a:solidFill>
+                <a:latin typeface="+mn-lt"/>
+                <a:ea typeface="+mn-ea"/>
+                <a:cs typeface="+mn-cs"/>
+              </a:defRPr>
+            </a:lvl2pPr>
+            <a:lvl3pPr marL="1143000" indent="-228600" algn="l" defTabSz="457200" rtl="0" eaLnBrk="1" latinLnBrk="0" hangingPunct="1">
+              <a:spcBef>
+                <a:spcPts val="1000"/>
+              </a:spcBef>
+              <a:spcAft>
+                <a:spcPts val="0"/>
+              </a:spcAft>
+              <a:buClr>
+                <a:schemeClr val="accent1"/>
+              </a:buClr>
+              <a:buSzPct val="80000"/>
+              <a:buFont typeface="Wingdings 3" charset="2"/>
+              <a:buChar char=""/>
+              <a:defRPr sz="1400" kern="1200">
+                <a:solidFill>
+                  <a:schemeClr val="tx1">
+                    <a:lumMod val="75000"/>
+                    <a:lumOff val="25000"/>
+                  </a:schemeClr>
+                </a:solidFill>
+                <a:latin typeface="+mn-lt"/>
+                <a:ea typeface="+mn-ea"/>
+                <a:cs typeface="+mn-cs"/>
+              </a:defRPr>
+            </a:lvl3pPr>
+            <a:lvl4pPr marL="1600200" indent="-228600" algn="l" defTabSz="457200" rtl="0" eaLnBrk="1" latinLnBrk="0" hangingPunct="1">
+              <a:spcBef>
+                <a:spcPts val="1000"/>
+              </a:spcBef>
+              <a:spcAft>
+                <a:spcPts val="0"/>
+              </a:spcAft>
+              <a:buClr>
+                <a:schemeClr val="accent1"/>
+              </a:buClr>
+              <a:buSzPct val="80000"/>
+              <a:buFont typeface="Wingdings 3" charset="2"/>
+              <a:buChar char=""/>
+              <a:defRPr sz="1200" kern="1200">
+                <a:solidFill>
+                  <a:schemeClr val="tx1">
+                    <a:lumMod val="75000"/>
+                    <a:lumOff val="25000"/>
+                  </a:schemeClr>
+                </a:solidFill>
+                <a:latin typeface="+mn-lt"/>
+                <a:ea typeface="+mn-ea"/>
+                <a:cs typeface="+mn-cs"/>
+              </a:defRPr>
+            </a:lvl4pPr>
+            <a:lvl5pPr marL="2057400" indent="-228600" algn="l" defTabSz="457200" rtl="0" eaLnBrk="1" latinLnBrk="0" hangingPunct="1">
+              <a:spcBef>
+                <a:spcPts val="1000"/>
+              </a:spcBef>
+              <a:spcAft>
+                <a:spcPts val="0"/>
+              </a:spcAft>
+              <a:buClr>
+                <a:schemeClr val="accent1"/>
+              </a:buClr>
+              <a:buSzPct val="80000"/>
+              <a:buFont typeface="Wingdings 3" charset="2"/>
+              <a:buChar char=""/>
+              <a:defRPr sz="1200" kern="1200">
+                <a:solidFill>
+                  <a:schemeClr val="tx1">
+                    <a:lumMod val="75000"/>
+                    <a:lumOff val="25000"/>
+                  </a:schemeClr>
+                </a:solidFill>
+                <a:latin typeface="+mn-lt"/>
+                <a:ea typeface="+mn-ea"/>
+                <a:cs typeface="+mn-cs"/>
+              </a:defRPr>
+            </a:lvl5pPr>
+            <a:lvl6pPr marL="2514600" indent="-228600" algn="l" defTabSz="457200" rtl="0" eaLnBrk="1" latinLnBrk="0" hangingPunct="1">
+              <a:spcBef>
+                <a:spcPts val="1000"/>
+              </a:spcBef>
+              <a:spcAft>
+                <a:spcPts val="0"/>
+              </a:spcAft>
+              <a:buClr>
+                <a:schemeClr val="accent1"/>
+              </a:buClr>
+              <a:buSzPct val="80000"/>
+              <a:buFont typeface="Wingdings 3" charset="2"/>
+              <a:buChar char=""/>
+              <a:defRPr sz="1200" kern="1200">
+                <a:solidFill>
+                  <a:schemeClr val="tx1">
+                    <a:lumMod val="75000"/>
+                    <a:lumOff val="25000"/>
+                  </a:schemeClr>
+                </a:solidFill>
+                <a:latin typeface="+mn-lt"/>
+                <a:ea typeface="+mn-ea"/>
+                <a:cs typeface="+mn-cs"/>
+              </a:defRPr>
+            </a:lvl6pPr>
+            <a:lvl7pPr marL="2971800" indent="-228600" algn="l" defTabSz="457200" rtl="0" eaLnBrk="1" latinLnBrk="0" hangingPunct="1">
+              <a:spcBef>
+                <a:spcPts val="1000"/>
+              </a:spcBef>
+              <a:spcAft>
+                <a:spcPts val="0"/>
+              </a:spcAft>
+              <a:buClr>
+                <a:schemeClr val="accent1"/>
+              </a:buClr>
+              <a:buSzPct val="80000"/>
+              <a:buFont typeface="Wingdings 3" charset="2"/>
+              <a:buChar char=""/>
+              <a:defRPr sz="1200" kern="1200">
+                <a:solidFill>
+                  <a:schemeClr val="tx1">
+                    <a:lumMod val="75000"/>
+                    <a:lumOff val="25000"/>
+                  </a:schemeClr>
+                </a:solidFill>
+                <a:latin typeface="+mn-lt"/>
+                <a:ea typeface="+mn-ea"/>
+                <a:cs typeface="+mn-cs"/>
+              </a:defRPr>
+            </a:lvl7pPr>
+            <a:lvl8pPr marL="3429000" indent="-228600" algn="l" defTabSz="457200" rtl="0" eaLnBrk="1" latinLnBrk="0" hangingPunct="1">
+              <a:spcBef>
+                <a:spcPts val="1000"/>
+              </a:spcBef>
+              <a:spcAft>
+                <a:spcPts val="0"/>
+              </a:spcAft>
+              <a:buClr>
+                <a:schemeClr val="accent1"/>
+              </a:buClr>
+              <a:buSzPct val="80000"/>
+              <a:buFont typeface="Wingdings 3" charset="2"/>
+              <a:buChar char=""/>
+              <a:defRPr sz="1200" kern="1200">
+                <a:solidFill>
+                  <a:schemeClr val="tx1">
+                    <a:lumMod val="75000"/>
+                    <a:lumOff val="25000"/>
+                  </a:schemeClr>
+                </a:solidFill>
+                <a:latin typeface="+mn-lt"/>
+                <a:ea typeface="+mn-ea"/>
+                <a:cs typeface="+mn-cs"/>
+              </a:defRPr>
+            </a:lvl8pPr>
+            <a:lvl9pPr marL="3886200" indent="-228600" algn="l" defTabSz="457200" rtl="0" eaLnBrk="1" latinLnBrk="0" hangingPunct="1">
+              <a:spcBef>
+                <a:spcPts val="1000"/>
+              </a:spcBef>
+              <a:spcAft>
+                <a:spcPts val="0"/>
+              </a:spcAft>
+              <a:buClr>
+                <a:schemeClr val="accent1"/>
+              </a:buClr>
+              <a:buSzPct val="80000"/>
+              <a:buFont typeface="Wingdings 3" charset="2"/>
+              <a:buChar char=""/>
+              <a:defRPr sz="1200" kern="1200">
+                <a:solidFill>
+                  <a:schemeClr val="tx1">
+                    <a:lumMod val="75000"/>
+                    <a:lumOff val="25000"/>
+                  </a:schemeClr>
+                </a:solidFill>
+                <a:latin typeface="+mn-lt"/>
+                <a:ea typeface="+mn-ea"/>
+                <a:cs typeface="+mn-cs"/>
+              </a:defRPr>
+            </a:lvl9pPr>
+          </a:lstStyle>
+          <a:p>
+            <a:pPr marL="0" indent="0">
+              <a:buNone/>
+            </a:pPr>
+            <a:r>
+              <a:rPr lang="fr-FR" sz="2200" dirty="0" smtClean="0">
+                <a:solidFill>
+                  <a:schemeClr val="accent1">
+                    <a:lumMod val="50000"/>
+                  </a:schemeClr>
+                </a:solidFill>
+              </a:rPr>
+              <a:t>Métriques</a:t>
+            </a:r>
+            <a:endParaRPr lang="fr-FR" sz="2200" dirty="0">
+              <a:solidFill>
+                <a:schemeClr val="accent1">
+                  <a:lumMod val="50000"/>
+                </a:schemeClr>
+              </a:solidFill>
+            </a:endParaRPr>
+          </a:p>
+        </p:txBody>
+      </p:sp>
+    </p:spTree>
+    <p:extLst>
+      <p:ext uri="{BB962C8B-B14F-4D97-AF65-F5344CB8AC3E}">
+        <p14:creationId xmlns:p14="http://schemas.microsoft.com/office/powerpoint/2010/main" val="1940381778"/>
       </p:ext>
     </p:extLst>
   </p:cSld>

</xml_diff>

<commit_message>
bergupdate: advanced onreport and changed script for comparing GIs
</commit_message>
<xml_diff>
--- a/docs/docs_I_made/slides/ASCAT.pptx
+++ b/docs/docs_I_made/slides/ASCAT.pptx
@@ -54,6 +54,7 @@
     <p:sldId id="296" r:id="rId48"/>
     <p:sldId id="298" r:id="rId49"/>
     <p:sldId id="341" r:id="rId50"/>
+    <p:sldId id="342" r:id="rId51"/>
   </p:sldIdLst>
   <p:sldSz cx="12192000" cy="6858000"/>
   <p:notesSz cx="6858000" cy="9144000"/>
@@ -906,7 +907,7 @@
             <a:fld id="{B61BEF0D-F0BB-DE4B-95CE-6DB70DBA9567}" type="datetimeFigureOut">
               <a:rPr lang="en-US" smtClean="0"/>
               <a:pPr/>
-              <a:t>5/24/2022</a:t>
+              <a:t>5/25/2022</a:t>
             </a:fld>
             <a:endParaRPr lang="en-US" dirty="0"/>
           </a:p>
@@ -1159,7 +1160,7 @@
             <a:fld id="{B61BEF0D-F0BB-DE4B-95CE-6DB70DBA9567}" type="datetimeFigureOut">
               <a:rPr lang="en-US" smtClean="0"/>
               <a:pPr/>
-              <a:t>5/24/2022</a:t>
+              <a:t>5/25/2022</a:t>
             </a:fld>
             <a:endParaRPr lang="en-US" dirty="0"/>
           </a:p>
@@ -1475,7 +1476,7 @@
             <a:fld id="{B61BEF0D-F0BB-DE4B-95CE-6DB70DBA9567}" type="datetimeFigureOut">
               <a:rPr lang="en-US" smtClean="0"/>
               <a:pPr/>
-              <a:t>5/24/2022</a:t>
+              <a:t>5/25/2022</a:t>
             </a:fld>
             <a:endParaRPr lang="en-US" dirty="0"/>
           </a:p>
@@ -1810,7 +1811,7 @@
             <a:fld id="{B61BEF0D-F0BB-DE4B-95CE-6DB70DBA9567}" type="datetimeFigureOut">
               <a:rPr lang="en-US" smtClean="0"/>
               <a:pPr/>
-              <a:t>5/24/2022</a:t>
+              <a:t>5/25/2022</a:t>
             </a:fld>
             <a:endParaRPr lang="en-US" dirty="0"/>
           </a:p>
@@ -2126,7 +2127,7 @@
             <a:fld id="{B61BEF0D-F0BB-DE4B-95CE-6DB70DBA9567}" type="datetimeFigureOut">
               <a:rPr lang="en-US" smtClean="0"/>
               <a:pPr/>
-              <a:t>5/24/2022</a:t>
+              <a:t>5/25/2022</a:t>
             </a:fld>
             <a:endParaRPr lang="en-US" dirty="0"/>
           </a:p>
@@ -2521,7 +2522,7 @@
             <a:fld id="{B61BEF0D-F0BB-DE4B-95CE-6DB70DBA9567}" type="datetimeFigureOut">
               <a:rPr lang="en-US" smtClean="0"/>
               <a:pPr/>
-              <a:t>5/24/2022</a:t>
+              <a:t>5/25/2022</a:t>
             </a:fld>
             <a:endParaRPr lang="en-US" dirty="0"/>
           </a:p>
@@ -2692,7 +2693,7 @@
           <a:p>
             <a:fld id="{55C6B4A9-1611-4792-9094-5F34BCA07E0B}" type="datetimeFigureOut">
               <a:rPr lang="en-US" smtClean="0"/>
-              <a:t>5/24/2022</a:t>
+              <a:t>5/25/2022</a:t>
             </a:fld>
             <a:endParaRPr lang="en-US" dirty="0"/>
           </a:p>
@@ -2873,7 +2874,7 @@
             <a:fld id="{B61BEF0D-F0BB-DE4B-95CE-6DB70DBA9567}" type="datetimeFigureOut">
               <a:rPr lang="en-US" smtClean="0"/>
               <a:pPr/>
-              <a:t>5/24/2022</a:t>
+              <a:t>5/25/2022</a:t>
             </a:fld>
             <a:endParaRPr lang="en-US" dirty="0"/>
           </a:p>
@@ -3045,7 +3046,7 @@
             <a:fld id="{B61BEF0D-F0BB-DE4B-95CE-6DB70DBA9567}" type="datetimeFigureOut">
               <a:rPr lang="en-US" smtClean="0"/>
               <a:pPr/>
-              <a:t>5/24/2022</a:t>
+              <a:t>5/25/2022</a:t>
             </a:fld>
             <a:endParaRPr lang="en-US" dirty="0"/>
           </a:p>
@@ -3294,7 +3295,7 @@
             <a:fld id="{B61BEF0D-F0BB-DE4B-95CE-6DB70DBA9567}" type="datetimeFigureOut">
               <a:rPr lang="en-US" smtClean="0"/>
               <a:pPr/>
-              <a:t>5/24/2022</a:t>
+              <a:t>5/25/2022</a:t>
             </a:fld>
             <a:endParaRPr lang="en-US" dirty="0"/>
           </a:p>
@@ -3527,7 +3528,7 @@
           <a:p>
             <a:fld id="{EB712588-04B1-427B-82EE-E8DB90309F08}" type="datetimeFigureOut">
               <a:rPr lang="en-US" smtClean="0"/>
-              <a:t>5/24/2022</a:t>
+              <a:t>5/25/2022</a:t>
             </a:fld>
             <a:endParaRPr lang="en-US" dirty="0"/>
           </a:p>
@@ -3902,7 +3903,7 @@
             <a:fld id="{B61BEF0D-F0BB-DE4B-95CE-6DB70DBA9567}" type="datetimeFigureOut">
               <a:rPr lang="en-US" smtClean="0"/>
               <a:pPr/>
-              <a:t>5/24/2022</a:t>
+              <a:t>5/25/2022</a:t>
             </a:fld>
             <a:endParaRPr lang="en-US" dirty="0"/>
           </a:p>
@@ -4027,7 +4028,7 @@
             <a:fld id="{B61BEF0D-F0BB-DE4B-95CE-6DB70DBA9567}" type="datetimeFigureOut">
               <a:rPr lang="en-US" smtClean="0"/>
               <a:pPr/>
-              <a:t>5/24/2022</a:t>
+              <a:t>5/25/2022</a:t>
             </a:fld>
             <a:endParaRPr lang="en-US" dirty="0"/>
           </a:p>
@@ -4124,7 +4125,7 @@
             <a:fld id="{B61BEF0D-F0BB-DE4B-95CE-6DB70DBA9567}" type="datetimeFigureOut">
               <a:rPr lang="en-US" smtClean="0"/>
               <a:pPr/>
-              <a:t>5/24/2022</a:t>
+              <a:t>5/25/2022</a:t>
             </a:fld>
             <a:endParaRPr lang="en-US" dirty="0"/>
           </a:p>
@@ -4380,7 +4381,7 @@
           <a:p>
             <a:fld id="{42A54C80-263E-416B-A8E0-580EDEADCBDC}" type="datetimeFigureOut">
               <a:rPr lang="en-US" smtClean="0"/>
-              <a:t>5/24/2022</a:t>
+              <a:t>5/25/2022</a:t>
             </a:fld>
             <a:endParaRPr lang="en-US" dirty="0"/>
           </a:p>
@@ -4687,7 +4688,7 @@
             <a:fld id="{B61BEF0D-F0BB-DE4B-95CE-6DB70DBA9567}" type="datetimeFigureOut">
               <a:rPr lang="en-US" smtClean="0"/>
               <a:pPr/>
-              <a:t>5/24/2022</a:t>
+              <a:t>5/25/2022</a:t>
             </a:fld>
             <a:endParaRPr lang="en-US" dirty="0"/>
           </a:p>
@@ -5390,7 +5391,7 @@
             <a:fld id="{B61BEF0D-F0BB-DE4B-95CE-6DB70DBA9567}" type="datetimeFigureOut">
               <a:rPr lang="en-US" smtClean="0"/>
               <a:pPr/>
-              <a:t>5/24/2022</a:t>
+              <a:t>5/25/2022</a:t>
             </a:fld>
             <a:endParaRPr lang="en-US" dirty="0"/>
           </a:p>
@@ -31227,11 +31228,7 @@
             </a:pPr>
             <a:r>
               <a:rPr lang="fr-FR" dirty="0" smtClean="0"/>
-              <a:t>En retournant l’équation, il est possible d’exprimer le nombre de copies de chaque allèle en fonction de ces paramètres</a:t>
-            </a:r>
-            <a:r>
-              <a:rPr lang="fr-FR" dirty="0" smtClean="0"/>
-              <a:t>.</a:t>
+              <a:t>En retournant l’équation, il est possible d’exprimer le nombre de copies de chaque allèle en fonction de ces paramètres.</a:t>
             </a:r>
           </a:p>
           <a:p>
@@ -39044,7 +39041,7 @@
         <p:spPr>
           <a:xfrm>
             <a:off x="6376250" y="3413912"/>
-            <a:ext cx="0" cy="2612941"/>
+            <a:ext cx="0" cy="2825671"/>
           </a:xfrm>
           <a:prstGeom prst="line">
             <a:avLst/>
@@ -39073,8 +39070,8 @@
         </p:nvCxnSpPr>
         <p:spPr>
           <a:xfrm flipH="1">
-            <a:off x="5841385" y="3362234"/>
-            <a:ext cx="466725" cy="0"/>
+            <a:off x="5798344" y="3362234"/>
+            <a:ext cx="509767" cy="0"/>
           </a:xfrm>
           <a:prstGeom prst="line">
             <a:avLst/>
@@ -39103,7 +39100,7 @@
         </p:nvSpPr>
         <p:spPr>
           <a:xfrm>
-            <a:off x="6165236" y="6177265"/>
+            <a:off x="6162853" y="6239583"/>
             <a:ext cx="953476" cy="246221"/>
           </a:xfrm>
           <a:prstGeom prst="rect">
@@ -43650,6 +43647,193 @@
     <p:extLst>
       <p:ext uri="{BB962C8B-B14F-4D97-AF65-F5344CB8AC3E}">
         <p14:creationId xmlns:p14="http://schemas.microsoft.com/office/powerpoint/2010/main" val="933991641"/>
+      </p:ext>
+    </p:extLst>
+  </p:cSld>
+  <p:clrMapOvr>
+    <a:masterClrMapping/>
+  </p:clrMapOvr>
+  <p:timing>
+    <p:tnLst>
+      <p:par>
+        <p:cTn id="1" dur="indefinite" restart="never" nodeType="tmRoot"/>
+      </p:par>
+    </p:tnLst>
+  </p:timing>
+</p:sld>
+</file>
+
+<file path=ppt/slides/slide50.xml><?xml version="1.0" encoding="utf-8"?>
+<p:sld xmlns:a="http://schemas.openxmlformats.org/drawingml/2006/main" xmlns:r="http://schemas.openxmlformats.org/officeDocument/2006/relationships" xmlns:p="http://schemas.openxmlformats.org/presentationml/2006/main" showMasterSp="0">
+  <p:cSld>
+    <p:spTree>
+      <p:nvGrpSpPr>
+        <p:cNvPr id="1" name=""/>
+        <p:cNvGrpSpPr/>
+        <p:nvPr/>
+      </p:nvGrpSpPr>
+      <p:grpSpPr>
+        <a:xfrm>
+          <a:off x="0" y="0"/>
+          <a:ext cx="0" cy="0"/>
+          <a:chOff x="0" y="0"/>
+          <a:chExt cx="0" cy="0"/>
+        </a:xfrm>
+      </p:grpSpPr>
+      <p:pic>
+        <p:nvPicPr>
+          <p:cNvPr id="18" name="Image 17"/>
+          <p:cNvPicPr>
+            <a:picLocks noChangeAspect="1"/>
+          </p:cNvPicPr>
+          <p:nvPr/>
+        </p:nvPicPr>
+        <p:blipFill>
+          <a:blip r:embed="rId2">
+            <a:extLst>
+              <a:ext uri="{28A0092B-C50C-407E-A947-70E740481C1C}">
+                <a14:useLocalDpi xmlns:a14="http://schemas.microsoft.com/office/drawing/2010/main" val="0"/>
+              </a:ext>
+            </a:extLst>
+          </a:blip>
+          <a:stretch>
+            <a:fillRect/>
+          </a:stretch>
+        </p:blipFill>
+        <p:spPr>
+          <a:xfrm>
+            <a:off x="5445711" y="2673733"/>
+            <a:ext cx="3751482" cy="3751482"/>
+          </a:xfrm>
+          <a:prstGeom prst="rect">
+            <a:avLst/>
+          </a:prstGeom>
+        </p:spPr>
+      </p:pic>
+      <p:cxnSp>
+        <p:nvCxnSpPr>
+          <p:cNvPr id="19" name="Connecteur droit 18"/>
+          <p:cNvCxnSpPr/>
+          <p:nvPr/>
+        </p:nvCxnSpPr>
+        <p:spPr>
+          <a:xfrm>
+            <a:off x="6376250" y="3413912"/>
+            <a:ext cx="0" cy="2825671"/>
+          </a:xfrm>
+          <a:prstGeom prst="line">
+            <a:avLst/>
+          </a:prstGeom>
+        </p:spPr>
+        <p:style>
+          <a:lnRef idx="1">
+            <a:schemeClr val="dk1"/>
+          </a:lnRef>
+          <a:fillRef idx="0">
+            <a:schemeClr val="dk1"/>
+          </a:fillRef>
+          <a:effectRef idx="0">
+            <a:schemeClr val="dk1"/>
+          </a:effectRef>
+          <a:fontRef idx="minor">
+            <a:schemeClr val="tx1"/>
+          </a:fontRef>
+        </p:style>
+      </p:cxnSp>
+      <p:cxnSp>
+        <p:nvCxnSpPr>
+          <p:cNvPr id="20" name="Connecteur droit 19"/>
+          <p:cNvCxnSpPr/>
+          <p:nvPr/>
+        </p:nvCxnSpPr>
+        <p:spPr>
+          <a:xfrm flipH="1">
+            <a:off x="5798344" y="3362234"/>
+            <a:ext cx="509767" cy="0"/>
+          </a:xfrm>
+          <a:prstGeom prst="line">
+            <a:avLst/>
+          </a:prstGeom>
+        </p:spPr>
+        <p:style>
+          <a:lnRef idx="1">
+            <a:schemeClr val="dk1"/>
+          </a:lnRef>
+          <a:fillRef idx="0">
+            <a:schemeClr val="dk1"/>
+          </a:fillRef>
+          <a:effectRef idx="0">
+            <a:schemeClr val="dk1"/>
+          </a:effectRef>
+          <a:fontRef idx="minor">
+            <a:schemeClr val="tx1"/>
+          </a:fontRef>
+        </p:style>
+      </p:cxnSp>
+      <p:sp>
+        <p:nvSpPr>
+          <p:cNvPr id="21" name="ZoneTexte 20"/>
+          <p:cNvSpPr txBox="1"/>
+          <p:nvPr/>
+        </p:nvSpPr>
+        <p:spPr>
+          <a:xfrm>
+            <a:off x="6162853" y="6239583"/>
+            <a:ext cx="953476" cy="246221"/>
+          </a:xfrm>
+          <a:prstGeom prst="rect">
+            <a:avLst/>
+          </a:prstGeom>
+          <a:noFill/>
+        </p:spPr>
+        <p:txBody>
+          <a:bodyPr wrap="square" rtlCol="0">
+            <a:spAutoFit/>
+          </a:bodyPr>
+          <a:lstStyle/>
+          <a:p>
+            <a:r>
+              <a:rPr lang="fr-FR" sz="1000" dirty="0" smtClean="0"/>
+              <a:t>1,75</a:t>
+            </a:r>
+            <a:endParaRPr lang="fr-FR" sz="1000" dirty="0"/>
+          </a:p>
+        </p:txBody>
+      </p:sp>
+      <p:sp>
+        <p:nvSpPr>
+          <p:cNvPr id="22" name="ZoneTexte 21"/>
+          <p:cNvSpPr txBox="1"/>
+          <p:nvPr/>
+        </p:nvSpPr>
+        <p:spPr>
+          <a:xfrm rot="16200000">
+            <a:off x="5229843" y="2966772"/>
+            <a:ext cx="953476" cy="246221"/>
+          </a:xfrm>
+          <a:prstGeom prst="rect">
+            <a:avLst/>
+          </a:prstGeom>
+          <a:noFill/>
+        </p:spPr>
+        <p:txBody>
+          <a:bodyPr wrap="square" rtlCol="0">
+            <a:spAutoFit/>
+          </a:bodyPr>
+          <a:lstStyle/>
+          <a:p>
+            <a:r>
+              <a:rPr lang="fr-FR" sz="1000" dirty="0" smtClean="0"/>
+              <a:t>0,83</a:t>
+            </a:r>
+            <a:endParaRPr lang="fr-FR" sz="1000" dirty="0"/>
+          </a:p>
+        </p:txBody>
+      </p:sp>
+    </p:spTree>
+    <p:extLst>
+      <p:ext uri="{BB962C8B-B14F-4D97-AF65-F5344CB8AC3E}">
+        <p14:creationId xmlns:p14="http://schemas.microsoft.com/office/powerpoint/2010/main" val="987397422"/>
       </p:ext>
     </p:extLst>
   </p:cSld>

</xml_diff>

<commit_message>
bergupdate: We discussed the results with CL, ED, MA & IS. I added 1-RV sample to scripts. Also I finished Mat & Met
</commit_message>
<xml_diff>
--- a/docs/docs_I_made/slides/ASCAT.pptx
+++ b/docs/docs_I_made/slides/ASCAT.pptx
@@ -907,7 +907,7 @@
             <a:fld id="{B61BEF0D-F0BB-DE4B-95CE-6DB70DBA9567}" type="datetimeFigureOut">
               <a:rPr lang="en-US" smtClean="0"/>
               <a:pPr/>
-              <a:t>5/25/2022</a:t>
+              <a:t>5/31/2022</a:t>
             </a:fld>
             <a:endParaRPr lang="en-US" dirty="0"/>
           </a:p>
@@ -1160,7 +1160,7 @@
             <a:fld id="{B61BEF0D-F0BB-DE4B-95CE-6DB70DBA9567}" type="datetimeFigureOut">
               <a:rPr lang="en-US" smtClean="0"/>
               <a:pPr/>
-              <a:t>5/25/2022</a:t>
+              <a:t>5/31/2022</a:t>
             </a:fld>
             <a:endParaRPr lang="en-US" dirty="0"/>
           </a:p>
@@ -1476,7 +1476,7 @@
             <a:fld id="{B61BEF0D-F0BB-DE4B-95CE-6DB70DBA9567}" type="datetimeFigureOut">
               <a:rPr lang="en-US" smtClean="0"/>
               <a:pPr/>
-              <a:t>5/25/2022</a:t>
+              <a:t>5/31/2022</a:t>
             </a:fld>
             <a:endParaRPr lang="en-US" dirty="0"/>
           </a:p>
@@ -1811,7 +1811,7 @@
             <a:fld id="{B61BEF0D-F0BB-DE4B-95CE-6DB70DBA9567}" type="datetimeFigureOut">
               <a:rPr lang="en-US" smtClean="0"/>
               <a:pPr/>
-              <a:t>5/25/2022</a:t>
+              <a:t>5/31/2022</a:t>
             </a:fld>
             <a:endParaRPr lang="en-US" dirty="0"/>
           </a:p>
@@ -2127,7 +2127,7 @@
             <a:fld id="{B61BEF0D-F0BB-DE4B-95CE-6DB70DBA9567}" type="datetimeFigureOut">
               <a:rPr lang="en-US" smtClean="0"/>
               <a:pPr/>
-              <a:t>5/25/2022</a:t>
+              <a:t>5/31/2022</a:t>
             </a:fld>
             <a:endParaRPr lang="en-US" dirty="0"/>
           </a:p>
@@ -2522,7 +2522,7 @@
             <a:fld id="{B61BEF0D-F0BB-DE4B-95CE-6DB70DBA9567}" type="datetimeFigureOut">
               <a:rPr lang="en-US" smtClean="0"/>
               <a:pPr/>
-              <a:t>5/25/2022</a:t>
+              <a:t>5/31/2022</a:t>
             </a:fld>
             <a:endParaRPr lang="en-US" dirty="0"/>
           </a:p>
@@ -2693,7 +2693,7 @@
           <a:p>
             <a:fld id="{55C6B4A9-1611-4792-9094-5F34BCA07E0B}" type="datetimeFigureOut">
               <a:rPr lang="en-US" smtClean="0"/>
-              <a:t>5/25/2022</a:t>
+              <a:t>5/31/2022</a:t>
             </a:fld>
             <a:endParaRPr lang="en-US" dirty="0"/>
           </a:p>
@@ -2874,7 +2874,7 @@
             <a:fld id="{B61BEF0D-F0BB-DE4B-95CE-6DB70DBA9567}" type="datetimeFigureOut">
               <a:rPr lang="en-US" smtClean="0"/>
               <a:pPr/>
-              <a:t>5/25/2022</a:t>
+              <a:t>5/31/2022</a:t>
             </a:fld>
             <a:endParaRPr lang="en-US" dirty="0"/>
           </a:p>
@@ -3046,7 +3046,7 @@
             <a:fld id="{B61BEF0D-F0BB-DE4B-95CE-6DB70DBA9567}" type="datetimeFigureOut">
               <a:rPr lang="en-US" smtClean="0"/>
               <a:pPr/>
-              <a:t>5/25/2022</a:t>
+              <a:t>5/31/2022</a:t>
             </a:fld>
             <a:endParaRPr lang="en-US" dirty="0"/>
           </a:p>
@@ -3295,7 +3295,7 @@
             <a:fld id="{B61BEF0D-F0BB-DE4B-95CE-6DB70DBA9567}" type="datetimeFigureOut">
               <a:rPr lang="en-US" smtClean="0"/>
               <a:pPr/>
-              <a:t>5/25/2022</a:t>
+              <a:t>5/31/2022</a:t>
             </a:fld>
             <a:endParaRPr lang="en-US" dirty="0"/>
           </a:p>
@@ -3528,7 +3528,7 @@
           <a:p>
             <a:fld id="{EB712588-04B1-427B-82EE-E8DB90309F08}" type="datetimeFigureOut">
               <a:rPr lang="en-US" smtClean="0"/>
-              <a:t>5/25/2022</a:t>
+              <a:t>5/31/2022</a:t>
             </a:fld>
             <a:endParaRPr lang="en-US" dirty="0"/>
           </a:p>
@@ -3903,7 +3903,7 @@
             <a:fld id="{B61BEF0D-F0BB-DE4B-95CE-6DB70DBA9567}" type="datetimeFigureOut">
               <a:rPr lang="en-US" smtClean="0"/>
               <a:pPr/>
-              <a:t>5/25/2022</a:t>
+              <a:t>5/31/2022</a:t>
             </a:fld>
             <a:endParaRPr lang="en-US" dirty="0"/>
           </a:p>
@@ -4028,7 +4028,7 @@
             <a:fld id="{B61BEF0D-F0BB-DE4B-95CE-6DB70DBA9567}" type="datetimeFigureOut">
               <a:rPr lang="en-US" smtClean="0"/>
               <a:pPr/>
-              <a:t>5/25/2022</a:t>
+              <a:t>5/31/2022</a:t>
             </a:fld>
             <a:endParaRPr lang="en-US" dirty="0"/>
           </a:p>
@@ -4125,7 +4125,7 @@
             <a:fld id="{B61BEF0D-F0BB-DE4B-95CE-6DB70DBA9567}" type="datetimeFigureOut">
               <a:rPr lang="en-US" smtClean="0"/>
               <a:pPr/>
-              <a:t>5/25/2022</a:t>
+              <a:t>5/31/2022</a:t>
             </a:fld>
             <a:endParaRPr lang="en-US" dirty="0"/>
           </a:p>
@@ -4381,7 +4381,7 @@
           <a:p>
             <a:fld id="{42A54C80-263E-416B-A8E0-580EDEADCBDC}" type="datetimeFigureOut">
               <a:rPr lang="en-US" smtClean="0"/>
-              <a:t>5/25/2022</a:t>
+              <a:t>5/31/2022</a:t>
             </a:fld>
             <a:endParaRPr lang="en-US" dirty="0"/>
           </a:p>
@@ -4688,7 +4688,7 @@
             <a:fld id="{B61BEF0D-F0BB-DE4B-95CE-6DB70DBA9567}" type="datetimeFigureOut">
               <a:rPr lang="en-US" smtClean="0"/>
               <a:pPr/>
-              <a:t>5/25/2022</a:t>
+              <a:t>5/31/2022</a:t>
             </a:fld>
             <a:endParaRPr lang="en-US" dirty="0"/>
           </a:p>
@@ -5391,7 +5391,7 @@
             <a:fld id="{B61BEF0D-F0BB-DE4B-95CE-6DB70DBA9567}" type="datetimeFigureOut">
               <a:rPr lang="en-US" smtClean="0"/>
               <a:pPr/>
-              <a:t>5/25/2022</a:t>
+              <a:t>5/31/2022</a:t>
             </a:fld>
             <a:endParaRPr lang="en-US" dirty="0"/>
           </a:p>

</xml_diff>

<commit_message>
bergupdate: backing up scripts changes
</commit_message>
<xml_diff>
--- a/docs/docs_I_made/slides/ASCAT.pptx
+++ b/docs/docs_I_made/slides/ASCAT.pptx
@@ -907,7 +907,7 @@
             <a:fld id="{B61BEF0D-F0BB-DE4B-95CE-6DB70DBA9567}" type="datetimeFigureOut">
               <a:rPr lang="en-US" smtClean="0"/>
               <a:pPr/>
-              <a:t>5/31/2022</a:t>
+              <a:t>6/3/2022</a:t>
             </a:fld>
             <a:endParaRPr lang="en-US" dirty="0"/>
           </a:p>
@@ -1160,7 +1160,7 @@
             <a:fld id="{B61BEF0D-F0BB-DE4B-95CE-6DB70DBA9567}" type="datetimeFigureOut">
               <a:rPr lang="en-US" smtClean="0"/>
               <a:pPr/>
-              <a:t>5/31/2022</a:t>
+              <a:t>6/3/2022</a:t>
             </a:fld>
             <a:endParaRPr lang="en-US" dirty="0"/>
           </a:p>
@@ -1476,7 +1476,7 @@
             <a:fld id="{B61BEF0D-F0BB-DE4B-95CE-6DB70DBA9567}" type="datetimeFigureOut">
               <a:rPr lang="en-US" smtClean="0"/>
               <a:pPr/>
-              <a:t>5/31/2022</a:t>
+              <a:t>6/3/2022</a:t>
             </a:fld>
             <a:endParaRPr lang="en-US" dirty="0"/>
           </a:p>
@@ -1811,7 +1811,7 @@
             <a:fld id="{B61BEF0D-F0BB-DE4B-95CE-6DB70DBA9567}" type="datetimeFigureOut">
               <a:rPr lang="en-US" smtClean="0"/>
               <a:pPr/>
-              <a:t>5/31/2022</a:t>
+              <a:t>6/3/2022</a:t>
             </a:fld>
             <a:endParaRPr lang="en-US" dirty="0"/>
           </a:p>
@@ -2127,7 +2127,7 @@
             <a:fld id="{B61BEF0D-F0BB-DE4B-95CE-6DB70DBA9567}" type="datetimeFigureOut">
               <a:rPr lang="en-US" smtClean="0"/>
               <a:pPr/>
-              <a:t>5/31/2022</a:t>
+              <a:t>6/3/2022</a:t>
             </a:fld>
             <a:endParaRPr lang="en-US" dirty="0"/>
           </a:p>
@@ -2522,7 +2522,7 @@
             <a:fld id="{B61BEF0D-F0BB-DE4B-95CE-6DB70DBA9567}" type="datetimeFigureOut">
               <a:rPr lang="en-US" smtClean="0"/>
               <a:pPr/>
-              <a:t>5/31/2022</a:t>
+              <a:t>6/3/2022</a:t>
             </a:fld>
             <a:endParaRPr lang="en-US" dirty="0"/>
           </a:p>
@@ -2693,7 +2693,7 @@
           <a:p>
             <a:fld id="{55C6B4A9-1611-4792-9094-5F34BCA07E0B}" type="datetimeFigureOut">
               <a:rPr lang="en-US" smtClean="0"/>
-              <a:t>5/31/2022</a:t>
+              <a:t>6/3/2022</a:t>
             </a:fld>
             <a:endParaRPr lang="en-US" dirty="0"/>
           </a:p>
@@ -2874,7 +2874,7 @@
             <a:fld id="{B61BEF0D-F0BB-DE4B-95CE-6DB70DBA9567}" type="datetimeFigureOut">
               <a:rPr lang="en-US" smtClean="0"/>
               <a:pPr/>
-              <a:t>5/31/2022</a:t>
+              <a:t>6/3/2022</a:t>
             </a:fld>
             <a:endParaRPr lang="en-US" dirty="0"/>
           </a:p>
@@ -3046,7 +3046,7 @@
             <a:fld id="{B61BEF0D-F0BB-DE4B-95CE-6DB70DBA9567}" type="datetimeFigureOut">
               <a:rPr lang="en-US" smtClean="0"/>
               <a:pPr/>
-              <a:t>5/31/2022</a:t>
+              <a:t>6/3/2022</a:t>
             </a:fld>
             <a:endParaRPr lang="en-US" dirty="0"/>
           </a:p>
@@ -3295,7 +3295,7 @@
             <a:fld id="{B61BEF0D-F0BB-DE4B-95CE-6DB70DBA9567}" type="datetimeFigureOut">
               <a:rPr lang="en-US" smtClean="0"/>
               <a:pPr/>
-              <a:t>5/31/2022</a:t>
+              <a:t>6/3/2022</a:t>
             </a:fld>
             <a:endParaRPr lang="en-US" dirty="0"/>
           </a:p>
@@ -3528,7 +3528,7 @@
           <a:p>
             <a:fld id="{EB712588-04B1-427B-82EE-E8DB90309F08}" type="datetimeFigureOut">
               <a:rPr lang="en-US" smtClean="0"/>
-              <a:t>5/31/2022</a:t>
+              <a:t>6/3/2022</a:t>
             </a:fld>
             <a:endParaRPr lang="en-US" dirty="0"/>
           </a:p>
@@ -3903,7 +3903,7 @@
             <a:fld id="{B61BEF0D-F0BB-DE4B-95CE-6DB70DBA9567}" type="datetimeFigureOut">
               <a:rPr lang="en-US" smtClean="0"/>
               <a:pPr/>
-              <a:t>5/31/2022</a:t>
+              <a:t>6/3/2022</a:t>
             </a:fld>
             <a:endParaRPr lang="en-US" dirty="0"/>
           </a:p>
@@ -4028,7 +4028,7 @@
             <a:fld id="{B61BEF0D-F0BB-DE4B-95CE-6DB70DBA9567}" type="datetimeFigureOut">
               <a:rPr lang="en-US" smtClean="0"/>
               <a:pPr/>
-              <a:t>5/31/2022</a:t>
+              <a:t>6/3/2022</a:t>
             </a:fld>
             <a:endParaRPr lang="en-US" dirty="0"/>
           </a:p>
@@ -4125,7 +4125,7 @@
             <a:fld id="{B61BEF0D-F0BB-DE4B-95CE-6DB70DBA9567}" type="datetimeFigureOut">
               <a:rPr lang="en-US" smtClean="0"/>
               <a:pPr/>
-              <a:t>5/31/2022</a:t>
+              <a:t>6/3/2022</a:t>
             </a:fld>
             <a:endParaRPr lang="en-US" dirty="0"/>
           </a:p>
@@ -4381,7 +4381,7 @@
           <a:p>
             <a:fld id="{42A54C80-263E-416B-A8E0-580EDEADCBDC}" type="datetimeFigureOut">
               <a:rPr lang="en-US" smtClean="0"/>
-              <a:t>5/31/2022</a:t>
+              <a:t>6/3/2022</a:t>
             </a:fld>
             <a:endParaRPr lang="en-US" dirty="0"/>
           </a:p>
@@ -4688,7 +4688,7 @@
             <a:fld id="{B61BEF0D-F0BB-DE4B-95CE-6DB70DBA9567}" type="datetimeFigureOut">
               <a:rPr lang="en-US" smtClean="0"/>
               <a:pPr/>
-              <a:t>5/31/2022</a:t>
+              <a:t>6/3/2022</a:t>
             </a:fld>
             <a:endParaRPr lang="en-US" dirty="0"/>
           </a:p>
@@ -5391,7 +5391,7 @@
             <a:fld id="{B61BEF0D-F0BB-DE4B-95CE-6DB70DBA9567}" type="datetimeFigureOut">
               <a:rPr lang="en-US" smtClean="0"/>
               <a:pPr/>
-              <a:t>5/31/2022</a:t>
+              <a:t>6/3/2022</a:t>
             </a:fld>
             <a:endParaRPr lang="en-US" dirty="0"/>
           </a:p>

</xml_diff>

<commit_message>
bergupdate: worked further on slides for oral presentation
</commit_message>
<xml_diff>
--- a/docs/docs_I_made/slides/ASCAT.pptx
+++ b/docs/docs_I_made/slides/ASCAT.pptx
@@ -907,7 +907,7 @@
             <a:fld id="{B61BEF0D-F0BB-DE4B-95CE-6DB70DBA9567}" type="datetimeFigureOut">
               <a:rPr lang="en-US" smtClean="0"/>
               <a:pPr/>
-              <a:t>6/3/2022</a:t>
+              <a:t>6/14/2022</a:t>
             </a:fld>
             <a:endParaRPr lang="en-US" dirty="0"/>
           </a:p>
@@ -1160,7 +1160,7 @@
             <a:fld id="{B61BEF0D-F0BB-DE4B-95CE-6DB70DBA9567}" type="datetimeFigureOut">
               <a:rPr lang="en-US" smtClean="0"/>
               <a:pPr/>
-              <a:t>6/3/2022</a:t>
+              <a:t>6/14/2022</a:t>
             </a:fld>
             <a:endParaRPr lang="en-US" dirty="0"/>
           </a:p>
@@ -1476,7 +1476,7 @@
             <a:fld id="{B61BEF0D-F0BB-DE4B-95CE-6DB70DBA9567}" type="datetimeFigureOut">
               <a:rPr lang="en-US" smtClean="0"/>
               <a:pPr/>
-              <a:t>6/3/2022</a:t>
+              <a:t>6/14/2022</a:t>
             </a:fld>
             <a:endParaRPr lang="en-US" dirty="0"/>
           </a:p>
@@ -1811,7 +1811,7 @@
             <a:fld id="{B61BEF0D-F0BB-DE4B-95CE-6DB70DBA9567}" type="datetimeFigureOut">
               <a:rPr lang="en-US" smtClean="0"/>
               <a:pPr/>
-              <a:t>6/3/2022</a:t>
+              <a:t>6/14/2022</a:t>
             </a:fld>
             <a:endParaRPr lang="en-US" dirty="0"/>
           </a:p>
@@ -2127,7 +2127,7 @@
             <a:fld id="{B61BEF0D-F0BB-DE4B-95CE-6DB70DBA9567}" type="datetimeFigureOut">
               <a:rPr lang="en-US" smtClean="0"/>
               <a:pPr/>
-              <a:t>6/3/2022</a:t>
+              <a:t>6/14/2022</a:t>
             </a:fld>
             <a:endParaRPr lang="en-US" dirty="0"/>
           </a:p>
@@ -2522,7 +2522,7 @@
             <a:fld id="{B61BEF0D-F0BB-DE4B-95CE-6DB70DBA9567}" type="datetimeFigureOut">
               <a:rPr lang="en-US" smtClean="0"/>
               <a:pPr/>
-              <a:t>6/3/2022</a:t>
+              <a:t>6/14/2022</a:t>
             </a:fld>
             <a:endParaRPr lang="en-US" dirty="0"/>
           </a:p>
@@ -2693,7 +2693,7 @@
           <a:p>
             <a:fld id="{55C6B4A9-1611-4792-9094-5F34BCA07E0B}" type="datetimeFigureOut">
               <a:rPr lang="en-US" smtClean="0"/>
-              <a:t>6/3/2022</a:t>
+              <a:t>6/14/2022</a:t>
             </a:fld>
             <a:endParaRPr lang="en-US" dirty="0"/>
           </a:p>
@@ -2874,7 +2874,7 @@
             <a:fld id="{B61BEF0D-F0BB-DE4B-95CE-6DB70DBA9567}" type="datetimeFigureOut">
               <a:rPr lang="en-US" smtClean="0"/>
               <a:pPr/>
-              <a:t>6/3/2022</a:t>
+              <a:t>6/14/2022</a:t>
             </a:fld>
             <a:endParaRPr lang="en-US" dirty="0"/>
           </a:p>
@@ -3046,7 +3046,7 @@
             <a:fld id="{B61BEF0D-F0BB-DE4B-95CE-6DB70DBA9567}" type="datetimeFigureOut">
               <a:rPr lang="en-US" smtClean="0"/>
               <a:pPr/>
-              <a:t>6/3/2022</a:t>
+              <a:t>6/14/2022</a:t>
             </a:fld>
             <a:endParaRPr lang="en-US" dirty="0"/>
           </a:p>
@@ -3295,7 +3295,7 @@
             <a:fld id="{B61BEF0D-F0BB-DE4B-95CE-6DB70DBA9567}" type="datetimeFigureOut">
               <a:rPr lang="en-US" smtClean="0"/>
               <a:pPr/>
-              <a:t>6/3/2022</a:t>
+              <a:t>6/14/2022</a:t>
             </a:fld>
             <a:endParaRPr lang="en-US" dirty="0"/>
           </a:p>
@@ -3528,7 +3528,7 @@
           <a:p>
             <a:fld id="{EB712588-04B1-427B-82EE-E8DB90309F08}" type="datetimeFigureOut">
               <a:rPr lang="en-US" smtClean="0"/>
-              <a:t>6/3/2022</a:t>
+              <a:t>6/14/2022</a:t>
             </a:fld>
             <a:endParaRPr lang="en-US" dirty="0"/>
           </a:p>
@@ -3903,7 +3903,7 @@
             <a:fld id="{B61BEF0D-F0BB-DE4B-95CE-6DB70DBA9567}" type="datetimeFigureOut">
               <a:rPr lang="en-US" smtClean="0"/>
               <a:pPr/>
-              <a:t>6/3/2022</a:t>
+              <a:t>6/14/2022</a:t>
             </a:fld>
             <a:endParaRPr lang="en-US" dirty="0"/>
           </a:p>
@@ -4028,7 +4028,7 @@
             <a:fld id="{B61BEF0D-F0BB-DE4B-95CE-6DB70DBA9567}" type="datetimeFigureOut">
               <a:rPr lang="en-US" smtClean="0"/>
               <a:pPr/>
-              <a:t>6/3/2022</a:t>
+              <a:t>6/14/2022</a:t>
             </a:fld>
             <a:endParaRPr lang="en-US" dirty="0"/>
           </a:p>
@@ -4125,7 +4125,7 @@
             <a:fld id="{B61BEF0D-F0BB-DE4B-95CE-6DB70DBA9567}" type="datetimeFigureOut">
               <a:rPr lang="en-US" smtClean="0"/>
               <a:pPr/>
-              <a:t>6/3/2022</a:t>
+              <a:t>6/14/2022</a:t>
             </a:fld>
             <a:endParaRPr lang="en-US" dirty="0"/>
           </a:p>
@@ -4381,7 +4381,7 @@
           <a:p>
             <a:fld id="{42A54C80-263E-416B-A8E0-580EDEADCBDC}" type="datetimeFigureOut">
               <a:rPr lang="en-US" smtClean="0"/>
-              <a:t>6/3/2022</a:t>
+              <a:t>6/14/2022</a:t>
             </a:fld>
             <a:endParaRPr lang="en-US" dirty="0"/>
           </a:p>
@@ -4688,7 +4688,7 @@
             <a:fld id="{B61BEF0D-F0BB-DE4B-95CE-6DB70DBA9567}" type="datetimeFigureOut">
               <a:rPr lang="en-US" smtClean="0"/>
               <a:pPr/>
-              <a:t>6/3/2022</a:t>
+              <a:t>6/14/2022</a:t>
             </a:fld>
             <a:endParaRPr lang="en-US" dirty="0"/>
           </a:p>
@@ -5391,7 +5391,7 @@
             <a:fld id="{B61BEF0D-F0BB-DE4B-95CE-6DB70DBA9567}" type="datetimeFigureOut">
               <a:rPr lang="en-US" smtClean="0"/>
               <a:pPr/>
-              <a:t>6/3/2022</a:t>
+              <a:t>6/14/2022</a:t>
             </a:fld>
             <a:endParaRPr lang="en-US" dirty="0"/>
           </a:p>
@@ -41970,6 +41970,39 @@
           </a:p>
         </p:txBody>
       </p:sp>
+      <p:sp>
+        <p:nvSpPr>
+          <p:cNvPr id="5" name="ZoneTexte 4"/>
+          <p:cNvSpPr txBox="1"/>
+          <p:nvPr/>
+        </p:nvSpPr>
+        <p:spPr>
+          <a:xfrm>
+            <a:off x="9433170" y="13727"/>
+            <a:ext cx="2758830" cy="215444"/>
+          </a:xfrm>
+          <a:prstGeom prst="rect">
+            <a:avLst/>
+          </a:prstGeom>
+          <a:noFill/>
+        </p:spPr>
+        <p:txBody>
+          <a:bodyPr wrap="square" rtlCol="0">
+            <a:spAutoFit/>
+          </a:bodyPr>
+          <a:lstStyle/>
+          <a:p>
+            <a:r>
+              <a:rPr lang="fr-FR" sz="800" dirty="0" smtClean="0"/>
+              <a:t>https</a:t>
+            </a:r>
+            <a:r>
+              <a:rPr lang="fr-FR" sz="800" dirty="0"/>
+              <a:t>://www.biodiscovery.com/videos/ascat-algorithm</a:t>
+            </a:r>
+          </a:p>
+        </p:txBody>
+      </p:sp>
     </p:spTree>
     <p:extLst>
       <p:ext uri="{BB962C8B-B14F-4D97-AF65-F5344CB8AC3E}">

</xml_diff>